<commit_message>
minor update to SparkExecutorMemory.pptx
</commit_message>
<xml_diff>
--- a/Spark_Notes/SparkExecutorMemory.pptx
+++ b/Spark_Notes/SparkExecutorMemory.pptx
@@ -243,7 +243,7 @@
           <a:p>
             <a:fld id="{D6A4B39F-B1B7-4540-9CD5-34E08F14BC09}" type="datetimeFigureOut">
               <a:rPr lang="en-GB" smtClean="0"/>
-              <a:t>09/09/2020</a:t>
+              <a:t>07/05/2021</a:t>
             </a:fld>
             <a:endParaRPr lang="en-GB"/>
           </a:p>
@@ -413,7 +413,7 @@
           <a:p>
             <a:fld id="{D6A4B39F-B1B7-4540-9CD5-34E08F14BC09}" type="datetimeFigureOut">
               <a:rPr lang="en-GB" smtClean="0"/>
-              <a:t>09/09/2020</a:t>
+              <a:t>07/05/2021</a:t>
             </a:fld>
             <a:endParaRPr lang="en-GB"/>
           </a:p>
@@ -593,7 +593,7 @@
           <a:p>
             <a:fld id="{D6A4B39F-B1B7-4540-9CD5-34E08F14BC09}" type="datetimeFigureOut">
               <a:rPr lang="en-GB" smtClean="0"/>
-              <a:t>09/09/2020</a:t>
+              <a:t>07/05/2021</a:t>
             </a:fld>
             <a:endParaRPr lang="en-GB"/>
           </a:p>
@@ -763,7 +763,7 @@
           <a:p>
             <a:fld id="{D6A4B39F-B1B7-4540-9CD5-34E08F14BC09}" type="datetimeFigureOut">
               <a:rPr lang="en-GB" smtClean="0"/>
-              <a:t>09/09/2020</a:t>
+              <a:t>07/05/2021</a:t>
             </a:fld>
             <a:endParaRPr lang="en-GB"/>
           </a:p>
@@ -1009,7 +1009,7 @@
           <a:p>
             <a:fld id="{D6A4B39F-B1B7-4540-9CD5-34E08F14BC09}" type="datetimeFigureOut">
               <a:rPr lang="en-GB" smtClean="0"/>
-              <a:t>09/09/2020</a:t>
+              <a:t>07/05/2021</a:t>
             </a:fld>
             <a:endParaRPr lang="en-GB"/>
           </a:p>
@@ -1241,7 +1241,7 @@
           <a:p>
             <a:fld id="{D6A4B39F-B1B7-4540-9CD5-34E08F14BC09}" type="datetimeFigureOut">
               <a:rPr lang="en-GB" smtClean="0"/>
-              <a:t>09/09/2020</a:t>
+              <a:t>07/05/2021</a:t>
             </a:fld>
             <a:endParaRPr lang="en-GB"/>
           </a:p>
@@ -1608,7 +1608,7 @@
           <a:p>
             <a:fld id="{D6A4B39F-B1B7-4540-9CD5-34E08F14BC09}" type="datetimeFigureOut">
               <a:rPr lang="en-GB" smtClean="0"/>
-              <a:t>09/09/2020</a:t>
+              <a:t>07/05/2021</a:t>
             </a:fld>
             <a:endParaRPr lang="en-GB"/>
           </a:p>
@@ -1726,7 +1726,7 @@
           <a:p>
             <a:fld id="{D6A4B39F-B1B7-4540-9CD5-34E08F14BC09}" type="datetimeFigureOut">
               <a:rPr lang="en-GB" smtClean="0"/>
-              <a:t>09/09/2020</a:t>
+              <a:t>07/05/2021</a:t>
             </a:fld>
             <a:endParaRPr lang="en-GB"/>
           </a:p>
@@ -1821,7 +1821,7 @@
           <a:p>
             <a:fld id="{D6A4B39F-B1B7-4540-9CD5-34E08F14BC09}" type="datetimeFigureOut">
               <a:rPr lang="en-GB" smtClean="0"/>
-              <a:t>09/09/2020</a:t>
+              <a:t>07/05/2021</a:t>
             </a:fld>
             <a:endParaRPr lang="en-GB"/>
           </a:p>
@@ -2098,7 +2098,7 @@
           <a:p>
             <a:fld id="{D6A4B39F-B1B7-4540-9CD5-34E08F14BC09}" type="datetimeFigureOut">
               <a:rPr lang="en-GB" smtClean="0"/>
-              <a:t>09/09/2020</a:t>
+              <a:t>07/05/2021</a:t>
             </a:fld>
             <a:endParaRPr lang="en-GB"/>
           </a:p>
@@ -2351,7 +2351,7 @@
           <a:p>
             <a:fld id="{D6A4B39F-B1B7-4540-9CD5-34E08F14BC09}" type="datetimeFigureOut">
               <a:rPr lang="en-GB" smtClean="0"/>
-              <a:t>09/09/2020</a:t>
+              <a:t>07/05/2021</a:t>
             </a:fld>
             <a:endParaRPr lang="en-GB"/>
           </a:p>
@@ -2564,7 +2564,7 @@
           <a:p>
             <a:fld id="{D6A4B39F-B1B7-4540-9CD5-34E08F14BC09}" type="datetimeFigureOut">
               <a:rPr lang="en-GB" smtClean="0"/>
-              <a:t>09/09/2020</a:t>
+              <a:t>07/05/2021</a:t>
             </a:fld>
             <a:endParaRPr lang="en-GB"/>
           </a:p>
@@ -2977,7 +2977,7 @@
         </p:nvSpPr>
         <p:spPr>
           <a:xfrm>
-            <a:off x="7741373" y="660086"/>
+            <a:off x="7748726" y="656499"/>
             <a:ext cx="4026254" cy="2677656"/>
           </a:xfrm>
           <a:prstGeom prst="rect">
@@ -2998,105 +2998,160 @@
           <a:p>
             <a:r>
               <a:rPr lang="en-US" sz="1200" noProof="1"/>
-              <a:t>Overhead memory: for OS, filesystem cache, redundancy, and other native memory allocations:</a:t>
-            </a:r>
-          </a:p>
-          <a:p>
-            <a:pPr marL="285757" indent="-285757">
+              <a:t>Overhead memory: </a:t>
+            </a:r>
+            <a:endParaRPr lang="en-US" sz="1200" noProof="1" smtClean="0"/>
+          </a:p>
+          <a:p>
+            <a:pPr marL="171450" indent="-171450">
               <a:buFontTx/>
               <a:buChar char="-"/>
             </a:pPr>
             <a:r>
+              <a:rPr lang="en-US" sz="1200" noProof="1" smtClean="0"/>
+              <a:t>for </a:t>
+            </a:r>
+            <a:r>
               <a:rPr lang="en-US" sz="1200" noProof="1"/>
-              <a:t>Default: max(0.1 * spark.executor.memory), 384MB)</a:t>
-            </a:r>
-          </a:p>
-          <a:p>
-            <a:pPr marL="285757" indent="-285757">
+              <a:t>OS, filesystem cache, redundancy, and other native memory </a:t>
+            </a:r>
+            <a:r>
+              <a:rPr lang="en-US" sz="1200" noProof="1" smtClean="0"/>
+              <a:t>allocations:</a:t>
+            </a:r>
+            <a:endParaRPr lang="en-US" sz="1200" noProof="1"/>
+          </a:p>
+          <a:p>
+            <a:pPr marL="171450" indent="-171450">
               <a:buFontTx/>
               <a:buChar char="-"/>
             </a:pPr>
             <a:r>
+              <a:rPr lang="en-US" sz="1200" noProof="1" smtClean="0"/>
+              <a:t>Configuration</a:t>
+            </a:r>
+            <a:r>
               <a:rPr lang="en-US" sz="1200" noProof="1"/>
-              <a:t>Configuration: spark.executor.memoryOverhead=&lt;size&gt;</a:t>
-            </a:r>
-          </a:p>
-          <a:p>
-            <a:pPr marL="285757" indent="-285757">
+              <a:t>: spark.executor.memoryOverhead=&lt;</a:t>
+            </a:r>
+            <a:r>
+              <a:rPr lang="en-US" sz="1200" noProof="1" smtClean="0"/>
+              <a:t>size&gt;</a:t>
+            </a:r>
+          </a:p>
+          <a:p>
+            <a:pPr marL="171450" indent="-171450">
               <a:buFontTx/>
               <a:buChar char="-"/>
             </a:pPr>
             <a:r>
               <a:rPr lang="en-US" sz="1200" noProof="1"/>
-              <a:t>K8S tunable: spark.kubernetes.memoryOverheadFactor</a:t>
-            </a:r>
-          </a:p>
-          <a:p>
-            <a:endParaRPr lang="en-US" sz="1200" noProof="1"/>
-          </a:p>
-          <a:p>
-            <a:r>
-              <a:rPr lang="en-US" sz="1200" noProof="1"/>
-              <a:t>Optional extra memory for off-heap unified memory pool:</a:t>
-            </a:r>
-          </a:p>
-          <a:p>
-            <a:pPr marL="285757" indent="-285757">
+              <a:t>Default: max(0.1 * spark.executor.memory), 384MB</a:t>
+            </a:r>
+            <a:r>
+              <a:rPr lang="en-US" sz="1200" noProof="1" smtClean="0"/>
+              <a:t>)</a:t>
+            </a:r>
+          </a:p>
+          <a:p>
+            <a:pPr marL="171450" indent="-171450">
               <a:buFontTx/>
               <a:buChar char="-"/>
             </a:pPr>
             <a:r>
+              <a:rPr lang="en-US" sz="1200" noProof="1" smtClean="0"/>
+              <a:t>K8S tunable: </a:t>
+            </a:r>
+            <a:r>
               <a:rPr lang="en-US" sz="1200" noProof="1"/>
-              <a:t>spark.memory.offHeap.size=&lt;size&gt;</a:t>
-            </a:r>
-          </a:p>
-          <a:p>
-            <a:pPr marL="285757" indent="-285757">
+              <a:t>spark.kubernetes.memoryOverheadFactor</a:t>
+            </a:r>
+          </a:p>
+          <a:p>
+            <a:endParaRPr lang="en-US" sz="1200" noProof="1"/>
+          </a:p>
+          <a:p>
+            <a:r>
+              <a:rPr lang="en-US" sz="1200" noProof="1" smtClean="0"/>
+              <a:t>Optional, off-heap </a:t>
+            </a:r>
+            <a:r>
+              <a:rPr lang="en-US" sz="1200" noProof="1"/>
+              <a:t>unified memory pool:</a:t>
+            </a:r>
+          </a:p>
+          <a:p>
+            <a:pPr marL="171450" indent="-171450">
               <a:buFontTx/>
               <a:buChar char="-"/>
             </a:pPr>
             <a:r>
+              <a:rPr lang="en-US" sz="1200" noProof="1" smtClean="0"/>
+              <a:t>spark.memory.offHeap.size</a:t>
+            </a:r>
+            <a:r>
               <a:rPr lang="en-US" sz="1200" noProof="1"/>
-              <a:t>spark.memory.offHeap.enabled=true</a:t>
-            </a:r>
-          </a:p>
-          <a:p>
-            <a:pPr marL="285757" indent="-285757">
+              <a:t>=&lt;</a:t>
+            </a:r>
+            <a:r>
+              <a:rPr lang="en-US" sz="1200" noProof="1" smtClean="0"/>
+              <a:t>size&gt;</a:t>
+            </a:r>
+          </a:p>
+          <a:p>
+            <a:pPr marL="171450" indent="-171450">
               <a:buFontTx/>
               <a:buChar char="-"/>
             </a:pPr>
             <a:r>
+              <a:rPr lang="en-US" sz="1200" noProof="1" smtClean="0"/>
+              <a:t>spark.memory.offHeap.enabled=true</a:t>
+            </a:r>
+            <a:endParaRPr lang="en-US" sz="1200" noProof="1"/>
+          </a:p>
+          <a:p>
+            <a:endParaRPr lang="en-US" sz="1200" noProof="1"/>
+          </a:p>
+          <a:p>
+            <a:r>
+              <a:rPr lang="en-US" sz="1200" noProof="1" smtClean="0"/>
+              <a:t>Optional, </a:t>
+            </a:r>
+            <a:r>
               <a:rPr lang="en-US" sz="1200" noProof="1"/>
-              <a:t>K8S: see SPARK-32661</a:t>
-            </a:r>
-          </a:p>
-          <a:p>
-            <a:endParaRPr lang="en-US" sz="1200" noProof="1"/>
-          </a:p>
-          <a:p>
-            <a:r>
-              <a:rPr lang="en-US" sz="1200" noProof="1"/>
-              <a:t>Optional extra memory for PySpark allocations:</a:t>
-            </a:r>
-          </a:p>
-          <a:p>
-            <a:pPr marL="285757" indent="-285757">
+              <a:t>memory for PySpark allocations:</a:t>
+            </a:r>
+          </a:p>
+          <a:p>
+            <a:pPr marL="171450" indent="-171450">
               <a:buFontTx/>
               <a:buChar char="-"/>
             </a:pPr>
             <a:r>
+              <a:rPr lang="en-US" sz="1200" noProof="1" smtClean="0"/>
+              <a:t>YARN</a:t>
+            </a:r>
+            <a:r>
               <a:rPr lang="en-US" sz="1200" noProof="1"/>
-              <a:t>YARN: spark.executor.pyspark.memory</a:t>
-            </a:r>
-          </a:p>
-          <a:p>
-            <a:pPr marL="285757" indent="-285757">
+              <a:t>: </a:t>
+            </a:r>
+            <a:r>
+              <a:rPr lang="en-US" sz="1200" noProof="1" smtClean="0"/>
+              <a:t>spark.executor.pyspark.memory</a:t>
+            </a:r>
+          </a:p>
+          <a:p>
+            <a:pPr marL="171450" indent="-171450">
               <a:buFontTx/>
               <a:buChar char="-"/>
             </a:pPr>
             <a:r>
+              <a:rPr lang="en-US" sz="1200" noProof="1" smtClean="0"/>
+              <a:t>K8S</a:t>
+            </a:r>
+            <a:r>
               <a:rPr lang="en-US" sz="1200" noProof="1"/>
-              <a:t>K8S: set also spark.kubernetes.resource.type="python"</a:t>
+              <a:t>: set also spark.kubernetes.resource.type="python"</a:t>
             </a:r>
           </a:p>
         </p:txBody>
@@ -3791,12 +3846,12 @@
             <a:lstStyle/>
             <a:p>
               <a:r>
-                <a:rPr lang="en-US" sz="1801" b="1" noProof="1"/>
-                <a:t>Optional</a:t>
+                <a:rPr lang="en-US" sz="1801" noProof="1" smtClean="0"/>
+                <a:t>Off-Heap </a:t>
               </a:r>
               <a:r>
                 <a:rPr lang="en-US" sz="1801" noProof="1"/>
-                <a:t>: Off-Heap Unified Memory Pool</a:t>
+                <a:t>Unified Memory Pool</a:t>
               </a:r>
             </a:p>
             <a:p>
@@ -3834,8 +3889,8 @@
           </p:nvSpPr>
           <p:spPr>
             <a:xfrm>
-              <a:off x="7781537" y="3977347"/>
-              <a:ext cx="3836502" cy="369460"/>
+              <a:off x="7781536" y="3977347"/>
+              <a:ext cx="4056661" cy="369460"/>
             </a:xfrm>
             <a:prstGeom prst="rect">
               <a:avLst/>
@@ -3849,12 +3904,8 @@
             <a:lstStyle/>
             <a:p>
               <a:r>
-                <a:rPr lang="en-US" sz="1801" noProof="1"/>
-                <a:t>Other Memory </a:t>
-              </a:r>
-              <a:r>
                 <a:rPr lang="en-US" sz="1801" noProof="1" smtClean="0"/>
-                <a:t>Allocations</a:t>
+                <a:t>Optional from Other Memory Allocations </a:t>
               </a:r>
               <a:endParaRPr lang="en-US" sz="1801" noProof="1"/>
             </a:p>
@@ -3944,7 +3995,15 @@
           <a:p>
             <a:r>
               <a:rPr lang="en-US" sz="1200" noProof="1"/>
-              <a:t>Versions 3.0 and 2.4</a:t>
+              <a:t>Versions </a:t>
+            </a:r>
+            <a:r>
+              <a:rPr lang="en-US" sz="1200" noProof="1" smtClean="0"/>
+              <a:t>3.x </a:t>
+            </a:r>
+            <a:r>
+              <a:rPr lang="en-US" sz="1200" noProof="1"/>
+              <a:t>and 2.4</a:t>
             </a:r>
           </a:p>
         </p:txBody>
@@ -3979,7 +4038,15 @@
             </a:r>
             <a:r>
               <a:rPr lang="en-US" sz="1300" noProof="1"/>
-              <a:t> - Aug 2020, CC </a:t>
+              <a:t> - </a:t>
+            </a:r>
+            <a:r>
+              <a:rPr lang="en-US" sz="1300" noProof="1" smtClean="0"/>
+              <a:t>Jul 2021, </a:t>
+            </a:r>
+            <a:r>
+              <a:rPr lang="en-US" sz="1300" noProof="1"/>
+              <a:t>CC </a:t>
             </a:r>
             <a:r>
               <a:rPr lang="en-US" sz="1300" noProof="1" smtClean="0"/>
@@ -4167,10 +4234,7 @@
             <a:avLst/>
           </a:prstGeom>
           <a:solidFill>
-            <a:schemeClr val="accent6">
-              <a:lumMod val="20000"/>
-              <a:lumOff val="80000"/>
-            </a:schemeClr>
+            <a:srgbClr val="F2D8EC"/>
           </a:solidFill>
         </p:spPr>
         <p:style>
@@ -4469,7 +4533,7 @@
         <p:spPr>
           <a:xfrm>
             <a:off x="670441" y="5334072"/>
-            <a:ext cx="2218501" cy="769102"/>
+            <a:ext cx="2218501" cy="777288"/>
           </a:xfrm>
           <a:prstGeom prst="rect">
             <a:avLst/>
@@ -4514,8 +4578,8 @@
         </p:nvSpPr>
         <p:spPr>
           <a:xfrm>
-            <a:off x="2646639" y="5334070"/>
-            <a:ext cx="2020457" cy="769104"/>
+            <a:off x="2646639" y="5334069"/>
+            <a:ext cx="2020457" cy="777291"/>
           </a:xfrm>
           <a:prstGeom prst="rect">
             <a:avLst/>

</xml_diff>

<commit_message>
Updated Spark Memory poster
</commit_message>
<xml_diff>
--- a/Spark_Notes/SparkExecutorMemory.pptx
+++ b/Spark_Notes/SparkExecutorMemory.pptx
@@ -154,7 +154,7 @@
           </a:lstStyle>
           <a:p>
             <a:r>
-              <a:rPr lang="en-US" smtClean="0"/>
+              <a:rPr lang="en-US"/>
               <a:t>Click to edit Master title style</a:t>
             </a:r>
             <a:endParaRPr lang="en-GB"/>
@@ -219,7 +219,7 @@
           </a:lstStyle>
           <a:p>
             <a:r>
-              <a:rPr lang="en-US" smtClean="0"/>
+              <a:rPr lang="en-US"/>
               <a:t>Click to edit Master subtitle style</a:t>
             </a:r>
             <a:endParaRPr lang="en-GB"/>
@@ -243,7 +243,7 @@
           <a:p>
             <a:fld id="{D6A4B39F-B1B7-4540-9CD5-34E08F14BC09}" type="datetimeFigureOut">
               <a:rPr lang="en-GB" smtClean="0"/>
-              <a:t>07/05/2021</a:t>
+              <a:t>14/12/2021</a:t>
             </a:fld>
             <a:endParaRPr lang="en-GB"/>
           </a:p>
@@ -337,7 +337,7 @@
           <a:lstStyle/>
           <a:p>
             <a:r>
-              <a:rPr lang="en-US" smtClean="0"/>
+              <a:rPr lang="en-US"/>
               <a:t>Click to edit Master title style</a:t>
             </a:r>
             <a:endParaRPr lang="en-GB"/>
@@ -361,35 +361,35 @@
           <a:p>
             <a:pPr lvl="0"/>
             <a:r>
-              <a:rPr lang="en-US" smtClean="0"/>
+              <a:rPr lang="en-US"/>
               <a:t>Edit Master text styles</a:t>
             </a:r>
           </a:p>
           <a:p>
             <a:pPr lvl="1"/>
             <a:r>
-              <a:rPr lang="en-US" smtClean="0"/>
+              <a:rPr lang="en-US"/>
               <a:t>Second level</a:t>
             </a:r>
           </a:p>
           <a:p>
             <a:pPr lvl="2"/>
             <a:r>
-              <a:rPr lang="en-US" smtClean="0"/>
+              <a:rPr lang="en-US"/>
               <a:t>Third level</a:t>
             </a:r>
           </a:p>
           <a:p>
             <a:pPr lvl="3"/>
             <a:r>
-              <a:rPr lang="en-US" smtClean="0"/>
+              <a:rPr lang="en-US"/>
               <a:t>Fourth level</a:t>
             </a:r>
           </a:p>
           <a:p>
             <a:pPr lvl="4"/>
             <a:r>
-              <a:rPr lang="en-US" smtClean="0"/>
+              <a:rPr lang="en-US"/>
               <a:t>Fifth level</a:t>
             </a:r>
             <a:endParaRPr lang="en-GB"/>
@@ -413,7 +413,7 @@
           <a:p>
             <a:fld id="{D6A4B39F-B1B7-4540-9CD5-34E08F14BC09}" type="datetimeFigureOut">
               <a:rPr lang="en-GB" smtClean="0"/>
-              <a:t>07/05/2021</a:t>
+              <a:t>14/12/2021</a:t>
             </a:fld>
             <a:endParaRPr lang="en-GB"/>
           </a:p>
@@ -512,7 +512,7 @@
           <a:lstStyle/>
           <a:p>
             <a:r>
-              <a:rPr lang="en-US" smtClean="0"/>
+              <a:rPr lang="en-US"/>
               <a:t>Click to edit Master title style</a:t>
             </a:r>
             <a:endParaRPr lang="en-GB"/>
@@ -541,35 +541,35 @@
           <a:p>
             <a:pPr lvl="0"/>
             <a:r>
-              <a:rPr lang="en-US" smtClean="0"/>
+              <a:rPr lang="en-US"/>
               <a:t>Edit Master text styles</a:t>
             </a:r>
           </a:p>
           <a:p>
             <a:pPr lvl="1"/>
             <a:r>
-              <a:rPr lang="en-US" smtClean="0"/>
+              <a:rPr lang="en-US"/>
               <a:t>Second level</a:t>
             </a:r>
           </a:p>
           <a:p>
             <a:pPr lvl="2"/>
             <a:r>
-              <a:rPr lang="en-US" smtClean="0"/>
+              <a:rPr lang="en-US"/>
               <a:t>Third level</a:t>
             </a:r>
           </a:p>
           <a:p>
             <a:pPr lvl="3"/>
             <a:r>
-              <a:rPr lang="en-US" smtClean="0"/>
+              <a:rPr lang="en-US"/>
               <a:t>Fourth level</a:t>
             </a:r>
           </a:p>
           <a:p>
             <a:pPr lvl="4"/>
             <a:r>
-              <a:rPr lang="en-US" smtClean="0"/>
+              <a:rPr lang="en-US"/>
               <a:t>Fifth level</a:t>
             </a:r>
             <a:endParaRPr lang="en-GB"/>
@@ -593,7 +593,7 @@
           <a:p>
             <a:fld id="{D6A4B39F-B1B7-4540-9CD5-34E08F14BC09}" type="datetimeFigureOut">
               <a:rPr lang="en-GB" smtClean="0"/>
-              <a:t>07/05/2021</a:t>
+              <a:t>14/12/2021</a:t>
             </a:fld>
             <a:endParaRPr lang="en-GB"/>
           </a:p>
@@ -687,7 +687,7 @@
           <a:lstStyle/>
           <a:p>
             <a:r>
-              <a:rPr lang="en-US" smtClean="0"/>
+              <a:rPr lang="en-US"/>
               <a:t>Click to edit Master title style</a:t>
             </a:r>
             <a:endParaRPr lang="en-GB"/>
@@ -711,35 +711,35 @@
           <a:p>
             <a:pPr lvl="0"/>
             <a:r>
-              <a:rPr lang="en-US" smtClean="0"/>
+              <a:rPr lang="en-US"/>
               <a:t>Edit Master text styles</a:t>
             </a:r>
           </a:p>
           <a:p>
             <a:pPr lvl="1"/>
             <a:r>
-              <a:rPr lang="en-US" smtClean="0"/>
+              <a:rPr lang="en-US"/>
               <a:t>Second level</a:t>
             </a:r>
           </a:p>
           <a:p>
             <a:pPr lvl="2"/>
             <a:r>
-              <a:rPr lang="en-US" smtClean="0"/>
+              <a:rPr lang="en-US"/>
               <a:t>Third level</a:t>
             </a:r>
           </a:p>
           <a:p>
             <a:pPr lvl="3"/>
             <a:r>
-              <a:rPr lang="en-US" smtClean="0"/>
+              <a:rPr lang="en-US"/>
               <a:t>Fourth level</a:t>
             </a:r>
           </a:p>
           <a:p>
             <a:pPr lvl="4"/>
             <a:r>
-              <a:rPr lang="en-US" smtClean="0"/>
+              <a:rPr lang="en-US"/>
               <a:t>Fifth level</a:t>
             </a:r>
             <a:endParaRPr lang="en-GB"/>
@@ -763,7 +763,7 @@
           <a:p>
             <a:fld id="{D6A4B39F-B1B7-4540-9CD5-34E08F14BC09}" type="datetimeFigureOut">
               <a:rPr lang="en-GB" smtClean="0"/>
-              <a:t>07/05/2021</a:t>
+              <a:t>14/12/2021</a:t>
             </a:fld>
             <a:endParaRPr lang="en-GB"/>
           </a:p>
@@ -866,7 +866,7 @@
           </a:lstStyle>
           <a:p>
             <a:r>
-              <a:rPr lang="en-US" smtClean="0"/>
+              <a:rPr lang="en-US"/>
               <a:t>Click to edit Master title style</a:t>
             </a:r>
             <a:endParaRPr lang="en-GB"/>
@@ -986,7 +986,7 @@
           <a:p>
             <a:pPr lvl="0"/>
             <a:r>
-              <a:rPr lang="en-US" smtClean="0"/>
+              <a:rPr lang="en-US"/>
               <a:t>Edit Master text styles</a:t>
             </a:r>
           </a:p>
@@ -1009,7 +1009,7 @@
           <a:p>
             <a:fld id="{D6A4B39F-B1B7-4540-9CD5-34E08F14BC09}" type="datetimeFigureOut">
               <a:rPr lang="en-GB" smtClean="0"/>
-              <a:t>07/05/2021</a:t>
+              <a:t>14/12/2021</a:t>
             </a:fld>
             <a:endParaRPr lang="en-GB"/>
           </a:p>
@@ -1103,7 +1103,7 @@
           <a:lstStyle/>
           <a:p>
             <a:r>
-              <a:rPr lang="en-US" smtClean="0"/>
+              <a:rPr lang="en-US"/>
               <a:t>Click to edit Master title style</a:t>
             </a:r>
             <a:endParaRPr lang="en-GB"/>
@@ -1132,35 +1132,35 @@
           <a:p>
             <a:pPr lvl="0"/>
             <a:r>
-              <a:rPr lang="en-US" smtClean="0"/>
+              <a:rPr lang="en-US"/>
               <a:t>Edit Master text styles</a:t>
             </a:r>
           </a:p>
           <a:p>
             <a:pPr lvl="1"/>
             <a:r>
-              <a:rPr lang="en-US" smtClean="0"/>
+              <a:rPr lang="en-US"/>
               <a:t>Second level</a:t>
             </a:r>
           </a:p>
           <a:p>
             <a:pPr lvl="2"/>
             <a:r>
-              <a:rPr lang="en-US" smtClean="0"/>
+              <a:rPr lang="en-US"/>
               <a:t>Third level</a:t>
             </a:r>
           </a:p>
           <a:p>
             <a:pPr lvl="3"/>
             <a:r>
-              <a:rPr lang="en-US" smtClean="0"/>
+              <a:rPr lang="en-US"/>
               <a:t>Fourth level</a:t>
             </a:r>
           </a:p>
           <a:p>
             <a:pPr lvl="4"/>
             <a:r>
-              <a:rPr lang="en-US" smtClean="0"/>
+              <a:rPr lang="en-US"/>
               <a:t>Fifth level</a:t>
             </a:r>
             <a:endParaRPr lang="en-GB"/>
@@ -1189,35 +1189,35 @@
           <a:p>
             <a:pPr lvl="0"/>
             <a:r>
-              <a:rPr lang="en-US" smtClean="0"/>
+              <a:rPr lang="en-US"/>
               <a:t>Edit Master text styles</a:t>
             </a:r>
           </a:p>
           <a:p>
             <a:pPr lvl="1"/>
             <a:r>
-              <a:rPr lang="en-US" smtClean="0"/>
+              <a:rPr lang="en-US"/>
               <a:t>Second level</a:t>
             </a:r>
           </a:p>
           <a:p>
             <a:pPr lvl="2"/>
             <a:r>
-              <a:rPr lang="en-US" smtClean="0"/>
+              <a:rPr lang="en-US"/>
               <a:t>Third level</a:t>
             </a:r>
           </a:p>
           <a:p>
             <a:pPr lvl="3"/>
             <a:r>
-              <a:rPr lang="en-US" smtClean="0"/>
+              <a:rPr lang="en-US"/>
               <a:t>Fourth level</a:t>
             </a:r>
           </a:p>
           <a:p>
             <a:pPr lvl="4"/>
             <a:r>
-              <a:rPr lang="en-US" smtClean="0"/>
+              <a:rPr lang="en-US"/>
               <a:t>Fifth level</a:t>
             </a:r>
             <a:endParaRPr lang="en-GB"/>
@@ -1241,7 +1241,7 @@
           <a:p>
             <a:fld id="{D6A4B39F-B1B7-4540-9CD5-34E08F14BC09}" type="datetimeFigureOut">
               <a:rPr lang="en-GB" smtClean="0"/>
-              <a:t>07/05/2021</a:t>
+              <a:t>14/12/2021</a:t>
             </a:fld>
             <a:endParaRPr lang="en-GB"/>
           </a:p>
@@ -1340,7 +1340,7 @@
           <a:lstStyle/>
           <a:p>
             <a:r>
-              <a:rPr lang="en-US" smtClean="0"/>
+              <a:rPr lang="en-US"/>
               <a:t>Click to edit Master title style</a:t>
             </a:r>
             <a:endParaRPr lang="en-GB"/>
@@ -1406,7 +1406,7 @@
           <a:p>
             <a:pPr lvl="0"/>
             <a:r>
-              <a:rPr lang="en-US" smtClean="0"/>
+              <a:rPr lang="en-US"/>
               <a:t>Edit Master text styles</a:t>
             </a:r>
           </a:p>
@@ -1434,35 +1434,35 @@
           <a:p>
             <a:pPr lvl="0"/>
             <a:r>
-              <a:rPr lang="en-US" smtClean="0"/>
+              <a:rPr lang="en-US"/>
               <a:t>Edit Master text styles</a:t>
             </a:r>
           </a:p>
           <a:p>
             <a:pPr lvl="1"/>
             <a:r>
-              <a:rPr lang="en-US" smtClean="0"/>
+              <a:rPr lang="en-US"/>
               <a:t>Second level</a:t>
             </a:r>
           </a:p>
           <a:p>
             <a:pPr lvl="2"/>
             <a:r>
-              <a:rPr lang="en-US" smtClean="0"/>
+              <a:rPr lang="en-US"/>
               <a:t>Third level</a:t>
             </a:r>
           </a:p>
           <a:p>
             <a:pPr lvl="3"/>
             <a:r>
-              <a:rPr lang="en-US" smtClean="0"/>
+              <a:rPr lang="en-US"/>
               <a:t>Fourth level</a:t>
             </a:r>
           </a:p>
           <a:p>
             <a:pPr lvl="4"/>
             <a:r>
-              <a:rPr lang="en-US" smtClean="0"/>
+              <a:rPr lang="en-US"/>
               <a:t>Fifth level</a:t>
             </a:r>
             <a:endParaRPr lang="en-GB"/>
@@ -1528,7 +1528,7 @@
           <a:p>
             <a:pPr lvl="0"/>
             <a:r>
-              <a:rPr lang="en-US" smtClean="0"/>
+              <a:rPr lang="en-US"/>
               <a:t>Edit Master text styles</a:t>
             </a:r>
           </a:p>
@@ -1556,35 +1556,35 @@
           <a:p>
             <a:pPr lvl="0"/>
             <a:r>
-              <a:rPr lang="en-US" smtClean="0"/>
+              <a:rPr lang="en-US"/>
               <a:t>Edit Master text styles</a:t>
             </a:r>
           </a:p>
           <a:p>
             <a:pPr lvl="1"/>
             <a:r>
-              <a:rPr lang="en-US" smtClean="0"/>
+              <a:rPr lang="en-US"/>
               <a:t>Second level</a:t>
             </a:r>
           </a:p>
           <a:p>
             <a:pPr lvl="2"/>
             <a:r>
-              <a:rPr lang="en-US" smtClean="0"/>
+              <a:rPr lang="en-US"/>
               <a:t>Third level</a:t>
             </a:r>
           </a:p>
           <a:p>
             <a:pPr lvl="3"/>
             <a:r>
-              <a:rPr lang="en-US" smtClean="0"/>
+              <a:rPr lang="en-US"/>
               <a:t>Fourth level</a:t>
             </a:r>
           </a:p>
           <a:p>
             <a:pPr lvl="4"/>
             <a:r>
-              <a:rPr lang="en-US" smtClean="0"/>
+              <a:rPr lang="en-US"/>
               <a:t>Fifth level</a:t>
             </a:r>
             <a:endParaRPr lang="en-GB"/>
@@ -1608,7 +1608,7 @@
           <a:p>
             <a:fld id="{D6A4B39F-B1B7-4540-9CD5-34E08F14BC09}" type="datetimeFigureOut">
               <a:rPr lang="en-GB" smtClean="0"/>
-              <a:t>07/05/2021</a:t>
+              <a:t>14/12/2021</a:t>
             </a:fld>
             <a:endParaRPr lang="en-GB"/>
           </a:p>
@@ -1702,7 +1702,7 @@
           <a:lstStyle/>
           <a:p>
             <a:r>
-              <a:rPr lang="en-US" smtClean="0"/>
+              <a:rPr lang="en-US"/>
               <a:t>Click to edit Master title style</a:t>
             </a:r>
             <a:endParaRPr lang="en-GB"/>
@@ -1726,7 +1726,7 @@
           <a:p>
             <a:fld id="{D6A4B39F-B1B7-4540-9CD5-34E08F14BC09}" type="datetimeFigureOut">
               <a:rPr lang="en-GB" smtClean="0"/>
-              <a:t>07/05/2021</a:t>
+              <a:t>14/12/2021</a:t>
             </a:fld>
             <a:endParaRPr lang="en-GB"/>
           </a:p>
@@ -1821,7 +1821,7 @@
           <a:p>
             <a:fld id="{D6A4B39F-B1B7-4540-9CD5-34E08F14BC09}" type="datetimeFigureOut">
               <a:rPr lang="en-GB" smtClean="0"/>
-              <a:t>07/05/2021</a:t>
+              <a:t>14/12/2021</a:t>
             </a:fld>
             <a:endParaRPr lang="en-GB"/>
           </a:p>
@@ -1924,7 +1924,7 @@
           </a:lstStyle>
           <a:p>
             <a:r>
-              <a:rPr lang="en-US" smtClean="0"/>
+              <a:rPr lang="en-US"/>
               <a:t>Click to edit Master title style</a:t>
             </a:r>
             <a:endParaRPr lang="en-GB"/>
@@ -1981,35 +1981,35 @@
           <a:p>
             <a:pPr lvl="0"/>
             <a:r>
-              <a:rPr lang="en-US" smtClean="0"/>
+              <a:rPr lang="en-US"/>
               <a:t>Edit Master text styles</a:t>
             </a:r>
           </a:p>
           <a:p>
             <a:pPr lvl="1"/>
             <a:r>
-              <a:rPr lang="en-US" smtClean="0"/>
+              <a:rPr lang="en-US"/>
               <a:t>Second level</a:t>
             </a:r>
           </a:p>
           <a:p>
             <a:pPr lvl="2"/>
             <a:r>
-              <a:rPr lang="en-US" smtClean="0"/>
+              <a:rPr lang="en-US"/>
               <a:t>Third level</a:t>
             </a:r>
           </a:p>
           <a:p>
             <a:pPr lvl="3"/>
             <a:r>
-              <a:rPr lang="en-US" smtClean="0"/>
+              <a:rPr lang="en-US"/>
               <a:t>Fourth level</a:t>
             </a:r>
           </a:p>
           <a:p>
             <a:pPr lvl="4"/>
             <a:r>
-              <a:rPr lang="en-US" smtClean="0"/>
+              <a:rPr lang="en-US"/>
               <a:t>Fifth level</a:t>
             </a:r>
             <a:endParaRPr lang="en-GB"/>
@@ -2075,7 +2075,7 @@
           <a:p>
             <a:pPr lvl="0"/>
             <a:r>
-              <a:rPr lang="en-US" smtClean="0"/>
+              <a:rPr lang="en-US"/>
               <a:t>Edit Master text styles</a:t>
             </a:r>
           </a:p>
@@ -2098,7 +2098,7 @@
           <a:p>
             <a:fld id="{D6A4B39F-B1B7-4540-9CD5-34E08F14BC09}" type="datetimeFigureOut">
               <a:rPr lang="en-GB" smtClean="0"/>
-              <a:t>07/05/2021</a:t>
+              <a:t>14/12/2021</a:t>
             </a:fld>
             <a:endParaRPr lang="en-GB"/>
           </a:p>
@@ -2201,7 +2201,7 @@
           </a:lstStyle>
           <a:p>
             <a:r>
-              <a:rPr lang="en-US" smtClean="0"/>
+              <a:rPr lang="en-US"/>
               <a:t>Click to edit Master title style</a:t>
             </a:r>
             <a:endParaRPr lang="en-GB"/>
@@ -2328,7 +2328,7 @@
           <a:p>
             <a:pPr lvl="0"/>
             <a:r>
-              <a:rPr lang="en-US" smtClean="0"/>
+              <a:rPr lang="en-US"/>
               <a:t>Edit Master text styles</a:t>
             </a:r>
           </a:p>
@@ -2351,7 +2351,7 @@
           <a:p>
             <a:fld id="{D6A4B39F-B1B7-4540-9CD5-34E08F14BC09}" type="datetimeFigureOut">
               <a:rPr lang="en-GB" smtClean="0"/>
-              <a:t>07/05/2021</a:t>
+              <a:t>14/12/2021</a:t>
             </a:fld>
             <a:endParaRPr lang="en-GB"/>
           </a:p>
@@ -2460,7 +2460,7 @@
           <a:lstStyle/>
           <a:p>
             <a:r>
-              <a:rPr lang="en-US" smtClean="0"/>
+              <a:rPr lang="en-US"/>
               <a:t>Click to edit Master title style</a:t>
             </a:r>
             <a:endParaRPr lang="en-GB"/>
@@ -2494,35 +2494,35 @@
           <a:p>
             <a:pPr lvl="0"/>
             <a:r>
-              <a:rPr lang="en-US" smtClean="0"/>
+              <a:rPr lang="en-US"/>
               <a:t>Edit Master text styles</a:t>
             </a:r>
           </a:p>
           <a:p>
             <a:pPr lvl="1"/>
             <a:r>
-              <a:rPr lang="en-US" smtClean="0"/>
+              <a:rPr lang="en-US"/>
               <a:t>Second level</a:t>
             </a:r>
           </a:p>
           <a:p>
             <a:pPr lvl="2"/>
             <a:r>
-              <a:rPr lang="en-US" smtClean="0"/>
+              <a:rPr lang="en-US"/>
               <a:t>Third level</a:t>
             </a:r>
           </a:p>
           <a:p>
             <a:pPr lvl="3"/>
             <a:r>
-              <a:rPr lang="en-US" smtClean="0"/>
+              <a:rPr lang="en-US"/>
               <a:t>Fourth level</a:t>
             </a:r>
           </a:p>
           <a:p>
             <a:pPr lvl="4"/>
             <a:r>
-              <a:rPr lang="en-US" smtClean="0"/>
+              <a:rPr lang="en-US"/>
               <a:t>Fifth level</a:t>
             </a:r>
             <a:endParaRPr lang="en-GB"/>
@@ -2564,7 +2564,7 @@
           <a:p>
             <a:fld id="{D6A4B39F-B1B7-4540-9CD5-34E08F14BC09}" type="datetimeFigureOut">
               <a:rPr lang="en-GB" smtClean="0"/>
-              <a:t>07/05/2021</a:t>
+              <a:t>14/12/2021</a:t>
             </a:fld>
             <a:endParaRPr lang="en-GB"/>
           </a:p>
@@ -2977,8 +2977,8 @@
         </p:nvSpPr>
         <p:spPr>
           <a:xfrm>
-            <a:off x="7748726" y="656499"/>
-            <a:ext cx="4026254" cy="2677656"/>
+            <a:off x="7759475" y="1430171"/>
+            <a:ext cx="4026254" cy="1938992"/>
           </a:xfrm>
           <a:prstGeom prst="rect">
             <a:avLst/>
@@ -3000,7 +3000,6 @@
               <a:rPr lang="en-US" sz="1200" noProof="1"/>
               <a:t>Overhead memory: </a:t>
             </a:r>
-            <a:endParaRPr lang="en-US" sz="1200" noProof="1" smtClean="0"/>
           </a:p>
           <a:p>
             <a:pPr marL="171450" indent="-171450">
@@ -3008,18 +3007,9 @@
               <a:buChar char="-"/>
             </a:pPr>
             <a:r>
-              <a:rPr lang="en-US" sz="1200" noProof="1" smtClean="0"/>
-              <a:t>for </a:t>
-            </a:r>
-            <a:r>
               <a:rPr lang="en-US" sz="1200" noProof="1"/>
-              <a:t>OS, filesystem cache, redundancy, and other native memory </a:t>
-            </a:r>
-            <a:r>
-              <a:rPr lang="en-US" sz="1200" noProof="1" smtClean="0"/>
-              <a:t>allocations:</a:t>
-            </a:r>
-            <a:endParaRPr lang="en-US" sz="1200" noProof="1"/>
+              <a:t>for OS, filesystem cache, redundancy, and other native memory allocations:</a:t>
+            </a:r>
           </a:p>
           <a:p>
             <a:pPr marL="171450" indent="-171450">
@@ -3027,16 +3017,8 @@
               <a:buChar char="-"/>
             </a:pPr>
             <a:r>
-              <a:rPr lang="en-US" sz="1200" noProof="1" smtClean="0"/>
-              <a:t>Configuration</a:t>
-            </a:r>
-            <a:r>
               <a:rPr lang="en-US" sz="1200" noProof="1"/>
-              <a:t>: spark.executor.memoryOverhead=&lt;</a:t>
-            </a:r>
-            <a:r>
-              <a:rPr lang="en-US" sz="1200" noProof="1" smtClean="0"/>
-              <a:t>size&gt;</a:t>
+              <a:t>Configuration: spark.executor.memoryOverhead=&lt;size&gt;</a:t>
             </a:r>
           </a:p>
           <a:p>
@@ -3046,11 +3028,7 @@
             </a:pPr>
             <a:r>
               <a:rPr lang="en-US" sz="1200" noProof="1"/>
-              <a:t>Default: max(0.1 * spark.executor.memory), 384MB</a:t>
-            </a:r>
-            <a:r>
-              <a:rPr lang="en-US" sz="1200" noProof="1" smtClean="0"/>
-              <a:t>)</a:t>
+              <a:t>Default: max(0.1 * spark.executor.memory), 384MB)</a:t>
             </a:r>
           </a:p>
           <a:p>
@@ -3059,12 +3037,8 @@
               <a:buChar char="-"/>
             </a:pPr>
             <a:r>
-              <a:rPr lang="en-US" sz="1200" noProof="1" smtClean="0"/>
-              <a:t>K8S tunable: </a:t>
-            </a:r>
-            <a:r>
               <a:rPr lang="en-US" sz="1200" noProof="1"/>
-              <a:t>spark.kubernetes.memoryOverheadFactor</a:t>
+              <a:t>K8S tunable: spark.kubernetes.memoryOverheadFactor</a:t>
             </a:r>
           </a:p>
           <a:p>
@@ -3072,12 +3046,8 @@
           </a:p>
           <a:p>
             <a:r>
-              <a:rPr lang="en-US" sz="1200" noProof="1" smtClean="0"/>
-              <a:t>Optional, off-heap </a:t>
-            </a:r>
-            <a:r>
               <a:rPr lang="en-US" sz="1200" noProof="1"/>
-              <a:t>unified memory pool:</a:t>
+              <a:t>Optional, memory for PySpark allocations:</a:t>
             </a:r>
           </a:p>
           <a:p>
@@ -3086,16 +3056,8 @@
               <a:buChar char="-"/>
             </a:pPr>
             <a:r>
-              <a:rPr lang="en-US" sz="1200" noProof="1" smtClean="0"/>
-              <a:t>spark.memory.offHeap.size</a:t>
-            </a:r>
-            <a:r>
               <a:rPr lang="en-US" sz="1200" noProof="1"/>
-              <a:t>=&lt;</a:t>
-            </a:r>
-            <a:r>
-              <a:rPr lang="en-US" sz="1200" noProof="1" smtClean="0"/>
-              <a:t>size&gt;</a:t>
+              <a:t>YARN: spark.executor.pyspark.memory</a:t>
             </a:r>
           </a:p>
           <a:p>
@@ -3104,54 +3066,8 @@
               <a:buChar char="-"/>
             </a:pPr>
             <a:r>
-              <a:rPr lang="en-US" sz="1200" noProof="1" smtClean="0"/>
-              <a:t>spark.memory.offHeap.enabled=true</a:t>
-            </a:r>
-            <a:endParaRPr lang="en-US" sz="1200" noProof="1"/>
-          </a:p>
-          <a:p>
-            <a:endParaRPr lang="en-US" sz="1200" noProof="1"/>
-          </a:p>
-          <a:p>
-            <a:r>
-              <a:rPr lang="en-US" sz="1200" noProof="1" smtClean="0"/>
-              <a:t>Optional, </a:t>
-            </a:r>
-            <a:r>
               <a:rPr lang="en-US" sz="1200" noProof="1"/>
-              <a:t>memory for PySpark allocations:</a:t>
-            </a:r>
-          </a:p>
-          <a:p>
-            <a:pPr marL="171450" indent="-171450">
-              <a:buFontTx/>
-              <a:buChar char="-"/>
-            </a:pPr>
-            <a:r>
-              <a:rPr lang="en-US" sz="1200" noProof="1" smtClean="0"/>
-              <a:t>YARN</a:t>
-            </a:r>
-            <a:r>
-              <a:rPr lang="en-US" sz="1200" noProof="1"/>
-              <a:t>: </a:t>
-            </a:r>
-            <a:r>
-              <a:rPr lang="en-US" sz="1200" noProof="1" smtClean="0"/>
-              <a:t>spark.executor.pyspark.memory</a:t>
-            </a:r>
-          </a:p>
-          <a:p>
-            <a:pPr marL="171450" indent="-171450">
-              <a:buFontTx/>
-              <a:buChar char="-"/>
-            </a:pPr>
-            <a:r>
-              <a:rPr lang="en-US" sz="1200" noProof="1" smtClean="0"/>
-              <a:t>K8S</a:t>
-            </a:r>
-            <a:r>
-              <a:rPr lang="en-US" sz="1200" noProof="1"/>
-              <a:t>: set also spark.kubernetes.resource.type="python"</a:t>
+              <a:t>K8S: set also spark.kubernetes.resource.type="python"</a:t>
             </a:r>
           </a:p>
         </p:txBody>
@@ -3164,8 +3080,8 @@
         </p:nvGrpSpPr>
         <p:grpSpPr>
           <a:xfrm>
-            <a:off x="2009273" y="1122618"/>
-            <a:ext cx="5326134" cy="2233631"/>
+            <a:off x="1927833" y="1138365"/>
+            <a:ext cx="5311216" cy="2233631"/>
             <a:chOff x="2062172" y="1273757"/>
             <a:chExt cx="5326134" cy="2233631"/>
           </a:xfrm>
@@ -3440,7 +3356,7 @@
               </a:pPr>
               <a:r>
                 <a:rPr lang="en-US" sz="1801" noProof="1"/>
-                <a:t>Off-Heap unified memory</a:t>
+                <a:t>PySpark allocations</a:t>
               </a:r>
             </a:p>
             <a:p>
@@ -3450,7 +3366,7 @@
               </a:pPr>
               <a:r>
                 <a:rPr lang="en-US" sz="1801" noProof="1"/>
-                <a:t>PySpark allocations</a:t>
+                <a:t>Off-Heap unified memory</a:t>
               </a:r>
             </a:p>
           </p:txBody>
@@ -3525,7 +3441,7 @@
         </p:nvGrpSpPr>
         <p:grpSpPr>
           <a:xfrm>
-            <a:off x="7741375" y="3918127"/>
+            <a:off x="7765123" y="3945838"/>
             <a:ext cx="4096823" cy="2181322"/>
             <a:chOff x="7741375" y="3918127"/>
             <a:chExt cx="4096823" cy="2181322"/>
@@ -3779,10 +3695,9 @@
             </a:p>
             <a:p>
               <a:r>
-                <a:rPr lang="en-US" sz="1801" noProof="1" smtClean="0"/>
+                <a:rPr lang="en-US" sz="1801" noProof="1"/>
                 <a:t>spark.memory.storageFraction=0.5</a:t>
               </a:r>
-              <a:endParaRPr lang="en-US" sz="1801" noProof="1"/>
             </a:p>
           </p:txBody>
         </p:sp>
@@ -3846,12 +3761,8 @@
             <a:lstStyle/>
             <a:p>
               <a:r>
-                <a:rPr lang="en-US" sz="1801" noProof="1" smtClean="0"/>
-                <a:t>Off-Heap </a:t>
-              </a:r>
-              <a:r>
                 <a:rPr lang="en-US" sz="1801" noProof="1"/>
-                <a:t>Unified Memory Pool</a:t>
+                <a:t>Off-Heap Unified Memory Pool</a:t>
               </a:r>
             </a:p>
             <a:p>
@@ -3860,12 +3771,8 @@
                 <a:buChar char="-"/>
               </a:pPr>
               <a:r>
-                <a:rPr lang="en-US" sz="1801" noProof="1" smtClean="0"/>
-                <a:t>spark.memory.offHeap.size=&lt;</a:t>
-              </a:r>
-              <a:r>
                 <a:rPr lang="en-US" sz="1801" noProof="1"/>
-                <a:t>size&gt;</a:t>
+                <a:t>spark.memory.offHeap.size=&lt;size&gt;</a:t>
               </a:r>
             </a:p>
             <a:p>
@@ -3874,10 +3781,9 @@
                 <a:buChar char="-"/>
               </a:pPr>
               <a:r>
-                <a:rPr lang="en-US" sz="1801" noProof="1" smtClean="0"/>
+                <a:rPr lang="en-US" sz="1801" noProof="1"/>
                 <a:t>spark.memory.offHeap.enabled=true</a:t>
               </a:r>
-              <a:endParaRPr lang="en-US" sz="1801" noProof="1"/>
             </a:p>
           </p:txBody>
         </p:sp>
@@ -3904,10 +3810,9 @@
             <a:lstStyle/>
             <a:p>
               <a:r>
-                <a:rPr lang="en-US" sz="1801" noProof="1" smtClean="0"/>
-                <a:t>Optional from Other Memory Allocations </a:t>
+                <a:rPr lang="en-US" sz="1801" noProof="1"/>
+                <a:t>Optional Off-Heap Unified Memory</a:t>
               </a:r>
-              <a:endParaRPr lang="en-US" sz="1801" noProof="1"/>
             </a:p>
           </p:txBody>
         </p:sp>
@@ -3995,15 +3900,7 @@
           <a:p>
             <a:r>
               <a:rPr lang="en-US" sz="1200" noProof="1"/>
-              <a:t>Versions </a:t>
-            </a:r>
-            <a:r>
-              <a:rPr lang="en-US" sz="1200" noProof="1" smtClean="0"/>
-              <a:t>3.x </a:t>
-            </a:r>
-            <a:r>
-              <a:rPr lang="en-US" sz="1200" noProof="1"/>
-              <a:t>and 2.4</a:t>
+              <a:t>Versions 3.x and 2.4</a:t>
             </a:r>
           </a:p>
         </p:txBody>
@@ -4038,25 +3935,8 @@
             </a:r>
             <a:r>
               <a:rPr lang="en-US" sz="1300" noProof="1"/>
-              <a:t> - </a:t>
-            </a:r>
-            <a:r>
-              <a:rPr lang="en-US" sz="1300" noProof="1" smtClean="0"/>
-              <a:t>May </a:t>
-            </a:r>
-            <a:r>
-              <a:rPr lang="en-US" sz="1300" noProof="1" smtClean="0"/>
-              <a:t>2021, </a:t>
-            </a:r>
-            <a:r>
-              <a:rPr lang="en-US" sz="1300" noProof="1"/>
-              <a:t>CC </a:t>
-            </a:r>
-            <a:r>
-              <a:rPr lang="en-US" sz="1300" noProof="1" smtClean="0"/>
-              <a:t>BY-SA 2.0</a:t>
-            </a:r>
-            <a:endParaRPr lang="en-US" sz="1300" noProof="1"/>
+              <a:t> - May 2021, CC BY-SA 2.0</a:t>
+            </a:r>
           </a:p>
         </p:txBody>
       </p:sp>
@@ -4068,8 +3948,8 @@
         </p:nvSpPr>
         <p:spPr>
           <a:xfrm>
-            <a:off x="2472514" y="3399490"/>
-            <a:ext cx="348250" cy="459384"/>
+            <a:off x="2447448" y="3415237"/>
+            <a:ext cx="291875" cy="459384"/>
           </a:xfrm>
           <a:prstGeom prst="downArrow">
             <a:avLst/>
@@ -4100,20 +3980,695 @@
           </a:p>
         </p:txBody>
       </p:sp>
+      <p:grpSp>
+        <p:nvGrpSpPr>
+          <p:cNvPr id="19" name="Group 18">
+            <a:extLst>
+              <a:ext uri="{FF2B5EF4-FFF2-40B4-BE49-F238E27FC236}">
+                <a16:creationId xmlns:a16="http://schemas.microsoft.com/office/drawing/2014/main" id="{A742CB54-C2C4-4CBE-AAB1-44DE7B2E6863}"/>
+              </a:ext>
+            </a:extLst>
+          </p:cNvPr>
+          <p:cNvGrpSpPr/>
+          <p:nvPr/>
+        </p:nvGrpSpPr>
+        <p:grpSpPr>
+          <a:xfrm>
+            <a:off x="589000" y="3945838"/>
+            <a:ext cx="6765803" cy="2184956"/>
+            <a:chOff x="670440" y="3930091"/>
+            <a:chExt cx="6765803" cy="2184956"/>
+          </a:xfrm>
+        </p:grpSpPr>
+        <p:cxnSp>
+          <p:nvCxnSpPr>
+            <p:cNvPr id="16" name="Straight Connector 15"/>
+            <p:cNvCxnSpPr/>
+            <p:nvPr/>
+          </p:nvCxnSpPr>
+          <p:spPr>
+            <a:xfrm>
+              <a:off x="6216115" y="4443162"/>
+              <a:ext cx="846237" cy="400950"/>
+            </a:xfrm>
+            <a:prstGeom prst="line">
+              <a:avLst/>
+            </a:prstGeom>
+          </p:spPr>
+          <p:style>
+            <a:lnRef idx="1">
+              <a:schemeClr val="accent1"/>
+            </a:lnRef>
+            <a:fillRef idx="0">
+              <a:schemeClr val="accent1"/>
+            </a:fillRef>
+            <a:effectRef idx="0">
+              <a:schemeClr val="accent1"/>
+            </a:effectRef>
+            <a:fontRef idx="minor">
+              <a:schemeClr val="tx1"/>
+            </a:fontRef>
+          </p:style>
+        </p:cxnSp>
+        <p:sp>
+          <p:nvSpPr>
+            <p:cNvPr id="40" name="Rectangle 39"/>
+            <p:cNvSpPr/>
+            <p:nvPr/>
+          </p:nvSpPr>
+          <p:spPr>
+            <a:xfrm>
+              <a:off x="670440" y="3930091"/>
+              <a:ext cx="6650049" cy="2174531"/>
+            </a:xfrm>
+            <a:prstGeom prst="rect">
+              <a:avLst/>
+            </a:prstGeom>
+            <a:solidFill>
+              <a:schemeClr val="accent1">
+                <a:lumMod val="20000"/>
+                <a:lumOff val="80000"/>
+              </a:schemeClr>
+            </a:solidFill>
+            <a:ln w="38100"/>
+          </p:spPr>
+          <p:style>
+            <a:lnRef idx="2">
+              <a:schemeClr val="accent1">
+                <a:shade val="50000"/>
+              </a:schemeClr>
+            </a:lnRef>
+            <a:fillRef idx="1">
+              <a:schemeClr val="accent1"/>
+            </a:fillRef>
+            <a:effectRef idx="0">
+              <a:schemeClr val="accent1"/>
+            </a:effectRef>
+            <a:fontRef idx="minor">
+              <a:schemeClr val="lt1"/>
+            </a:fontRef>
+          </p:style>
+          <p:txBody>
+            <a:bodyPr rtlCol="0" anchor="ctr"/>
+            <a:lstStyle/>
+            <a:p>
+              <a:pPr algn="ctr"/>
+              <a:endParaRPr lang="en-US" sz="1801" noProof="1"/>
+            </a:p>
+          </p:txBody>
+        </p:sp>
+        <p:sp>
+          <p:nvSpPr>
+            <p:cNvPr id="41" name="Rectangle 40"/>
+            <p:cNvSpPr/>
+            <p:nvPr/>
+          </p:nvSpPr>
+          <p:spPr>
+            <a:xfrm>
+              <a:off x="670441" y="4552562"/>
+              <a:ext cx="3996167" cy="1562485"/>
+            </a:xfrm>
+            <a:prstGeom prst="rect">
+              <a:avLst/>
+            </a:prstGeom>
+            <a:solidFill>
+              <a:schemeClr val="accent2">
+                <a:lumMod val="40000"/>
+                <a:lumOff val="60000"/>
+              </a:schemeClr>
+            </a:solidFill>
+          </p:spPr>
+          <p:style>
+            <a:lnRef idx="2">
+              <a:schemeClr val="accent1">
+                <a:shade val="50000"/>
+              </a:schemeClr>
+            </a:lnRef>
+            <a:fillRef idx="1">
+              <a:schemeClr val="accent1"/>
+            </a:fillRef>
+            <a:effectRef idx="0">
+              <a:schemeClr val="accent1"/>
+            </a:effectRef>
+            <a:fontRef idx="minor">
+              <a:schemeClr val="lt1"/>
+            </a:fontRef>
+          </p:style>
+          <p:txBody>
+            <a:bodyPr rtlCol="0" anchor="ctr"/>
+            <a:lstStyle/>
+            <a:p>
+              <a:pPr algn="ctr"/>
+              <a:endParaRPr lang="en-US" sz="1801" noProof="1"/>
+            </a:p>
+          </p:txBody>
+        </p:sp>
+        <p:sp>
+          <p:nvSpPr>
+            <p:cNvPr id="42" name="Rectangle 41"/>
+            <p:cNvSpPr/>
+            <p:nvPr/>
+          </p:nvSpPr>
+          <p:spPr>
+            <a:xfrm>
+              <a:off x="4668731" y="4550448"/>
+              <a:ext cx="1598269" cy="1557225"/>
+            </a:xfrm>
+            <a:prstGeom prst="rect">
+              <a:avLst/>
+            </a:prstGeom>
+            <a:solidFill>
+              <a:srgbClr val="F2D8EC"/>
+            </a:solidFill>
+          </p:spPr>
+          <p:style>
+            <a:lnRef idx="2">
+              <a:schemeClr val="accent1">
+                <a:shade val="50000"/>
+              </a:schemeClr>
+            </a:lnRef>
+            <a:fillRef idx="1">
+              <a:schemeClr val="accent1"/>
+            </a:fillRef>
+            <a:effectRef idx="0">
+              <a:schemeClr val="accent1"/>
+            </a:effectRef>
+            <a:fontRef idx="minor">
+              <a:schemeClr val="lt1"/>
+            </a:fontRef>
+          </p:style>
+          <p:txBody>
+            <a:bodyPr rtlCol="0" anchor="ctr"/>
+            <a:lstStyle/>
+            <a:p>
+              <a:endParaRPr lang="en-US" sz="1801" noProof="1">
+                <a:solidFill>
+                  <a:schemeClr val="tx1"/>
+                </a:solidFill>
+              </a:endParaRPr>
+            </a:p>
+          </p:txBody>
+        </p:sp>
+        <p:sp>
+          <p:nvSpPr>
+            <p:cNvPr id="43" name="TextBox 42"/>
+            <p:cNvSpPr txBox="1"/>
+            <p:nvPr/>
+          </p:nvSpPr>
+          <p:spPr>
+            <a:xfrm>
+              <a:off x="697963" y="3931982"/>
+              <a:ext cx="3325259" cy="646587"/>
+            </a:xfrm>
+            <a:prstGeom prst="rect">
+              <a:avLst/>
+            </a:prstGeom>
+            <a:noFill/>
+          </p:spPr>
+          <p:txBody>
+            <a:bodyPr wrap="square" rtlCol="0">
+              <a:spAutoFit/>
+            </a:bodyPr>
+            <a:lstStyle/>
+            <a:p>
+              <a:r>
+                <a:rPr lang="en-US" sz="1801" noProof="1"/>
+                <a:t>Executor JVM Heap</a:t>
+              </a:r>
+            </a:p>
+            <a:p>
+              <a:r>
+                <a:rPr lang="en-US" sz="1801" b="1" noProof="1"/>
+                <a:t>spark.executor.memory=&lt;size&gt;</a:t>
+              </a:r>
+              <a:endParaRPr lang="en-US" sz="1801" noProof="1"/>
+            </a:p>
+          </p:txBody>
+        </p:sp>
+        <p:sp>
+          <p:nvSpPr>
+            <p:cNvPr id="44" name="TextBox 43"/>
+            <p:cNvSpPr txBox="1"/>
+            <p:nvPr/>
+          </p:nvSpPr>
+          <p:spPr>
+            <a:xfrm>
+              <a:off x="697772" y="4625737"/>
+              <a:ext cx="3169413" cy="646587"/>
+            </a:xfrm>
+            <a:prstGeom prst="rect">
+              <a:avLst/>
+            </a:prstGeom>
+            <a:noFill/>
+            <a:ln>
+              <a:noFill/>
+            </a:ln>
+          </p:spPr>
+          <p:txBody>
+            <a:bodyPr wrap="square" rtlCol="0">
+              <a:spAutoFit/>
+            </a:bodyPr>
+            <a:lstStyle/>
+            <a:p>
+              <a:r>
+                <a:rPr lang="en-US" sz="1801" noProof="1"/>
+                <a:t>On-Heap Unified Memory Pool</a:t>
+              </a:r>
+            </a:p>
+            <a:p>
+              <a:r>
+                <a:rPr lang="en-US" sz="1801" b="1" noProof="1"/>
+                <a:t>spark.memory.fraction</a:t>
+              </a:r>
+              <a:r>
+                <a:rPr lang="en-US" sz="1801" noProof="1"/>
+                <a:t>=0.6</a:t>
+              </a:r>
+            </a:p>
+          </p:txBody>
+        </p:sp>
+        <p:sp>
+          <p:nvSpPr>
+            <p:cNvPr id="45" name="Rectangle 44"/>
+            <p:cNvSpPr/>
+            <p:nvPr/>
+          </p:nvSpPr>
+          <p:spPr>
+            <a:xfrm>
+              <a:off x="6259399" y="4550448"/>
+              <a:ext cx="1049559" cy="1557226"/>
+            </a:xfrm>
+            <a:prstGeom prst="rect">
+              <a:avLst/>
+            </a:prstGeom>
+            <a:solidFill>
+              <a:schemeClr val="bg2">
+                <a:lumMod val="90000"/>
+              </a:schemeClr>
+            </a:solidFill>
+            <a:ln>
+              <a:solidFill>
+                <a:schemeClr val="tx1">
+                  <a:lumMod val="50000"/>
+                  <a:lumOff val="50000"/>
+                </a:schemeClr>
+              </a:solidFill>
+            </a:ln>
+          </p:spPr>
+          <p:style>
+            <a:lnRef idx="2">
+              <a:schemeClr val="accent1">
+                <a:shade val="50000"/>
+              </a:schemeClr>
+            </a:lnRef>
+            <a:fillRef idx="1">
+              <a:schemeClr val="accent1"/>
+            </a:fillRef>
+            <a:effectRef idx="0">
+              <a:schemeClr val="accent1"/>
+            </a:effectRef>
+            <a:fontRef idx="minor">
+              <a:schemeClr val="lt1"/>
+            </a:fontRef>
+          </p:style>
+          <p:txBody>
+            <a:bodyPr rtlCol="0" anchor="ctr"/>
+            <a:lstStyle/>
+            <a:p>
+              <a:pPr algn="ctr"/>
+              <a:endParaRPr lang="en-US" sz="1801" noProof="1">
+                <a:solidFill>
+                  <a:schemeClr val="tx1"/>
+                </a:solidFill>
+              </a:endParaRPr>
+            </a:p>
+          </p:txBody>
+        </p:sp>
+        <p:sp>
+          <p:nvSpPr>
+            <p:cNvPr id="32" name="TextBox 31"/>
+            <p:cNvSpPr txBox="1"/>
+            <p:nvPr/>
+          </p:nvSpPr>
+          <p:spPr>
+            <a:xfrm>
+              <a:off x="4664529" y="4546585"/>
+              <a:ext cx="1540056" cy="1477969"/>
+            </a:xfrm>
+            <a:prstGeom prst="rect">
+              <a:avLst/>
+            </a:prstGeom>
+            <a:noFill/>
+          </p:spPr>
+          <p:txBody>
+            <a:bodyPr wrap="square" rtlCol="0">
+              <a:spAutoFit/>
+            </a:bodyPr>
+            <a:lstStyle/>
+            <a:p>
+              <a:r>
+                <a:rPr lang="en-US" sz="1801" noProof="1"/>
+                <a:t>User Memory:</a:t>
+              </a:r>
+            </a:p>
+            <a:p>
+              <a:r>
+                <a:rPr lang="en-US" sz="1801" noProof="1"/>
+                <a:t>1 -spark.memory.fraction=0.4</a:t>
+              </a:r>
+            </a:p>
+            <a:p>
+              <a:endParaRPr lang="en-GB" sz="1801" dirty="0"/>
+            </a:p>
+          </p:txBody>
+        </p:sp>
+        <p:cxnSp>
+          <p:nvCxnSpPr>
+            <p:cNvPr id="46" name="Straight Connector 45"/>
+            <p:cNvCxnSpPr/>
+            <p:nvPr/>
+          </p:nvCxnSpPr>
+          <p:spPr>
+            <a:xfrm>
+              <a:off x="6261500" y="4557186"/>
+              <a:ext cx="4281" cy="1554174"/>
+            </a:xfrm>
+            <a:prstGeom prst="line">
+              <a:avLst/>
+            </a:prstGeom>
+            <a:ln w="28575">
+              <a:solidFill>
+                <a:schemeClr val="tx1"/>
+              </a:solidFill>
+            </a:ln>
+          </p:spPr>
+          <p:style>
+            <a:lnRef idx="1">
+              <a:schemeClr val="accent1"/>
+            </a:lnRef>
+            <a:fillRef idx="0">
+              <a:schemeClr val="accent1"/>
+            </a:fillRef>
+            <a:effectRef idx="0">
+              <a:schemeClr val="accent1"/>
+            </a:effectRef>
+            <a:fontRef idx="minor">
+              <a:schemeClr val="tx1"/>
+            </a:fontRef>
+          </p:style>
+        </p:cxnSp>
+        <p:sp>
+          <p:nvSpPr>
+            <p:cNvPr id="33" name="TextBox 32"/>
+            <p:cNvSpPr txBox="1"/>
+            <p:nvPr/>
+          </p:nvSpPr>
+          <p:spPr>
+            <a:xfrm>
+              <a:off x="6142733" y="4552563"/>
+              <a:ext cx="1293510" cy="923714"/>
+            </a:xfrm>
+            <a:prstGeom prst="rect">
+              <a:avLst/>
+            </a:prstGeom>
+            <a:noFill/>
+          </p:spPr>
+          <p:txBody>
+            <a:bodyPr wrap="square" rtlCol="0">
+              <a:spAutoFit/>
+            </a:bodyPr>
+            <a:lstStyle/>
+            <a:p>
+              <a:pPr algn="ctr"/>
+              <a:r>
+                <a:rPr lang="en-US" sz="1801" noProof="1"/>
+                <a:t>Reserved Memory:</a:t>
+              </a:r>
+            </a:p>
+            <a:p>
+              <a:pPr algn="ctr"/>
+              <a:r>
+                <a:rPr lang="en-US" sz="1801" noProof="1"/>
+                <a:t>300 MB</a:t>
+              </a:r>
+              <a:endParaRPr lang="en-GB" sz="1801" dirty="0"/>
+            </a:p>
+          </p:txBody>
+        </p:sp>
+        <p:sp>
+          <p:nvSpPr>
+            <p:cNvPr id="47" name="Rectangle 46"/>
+            <p:cNvSpPr/>
+            <p:nvPr/>
+          </p:nvSpPr>
+          <p:spPr>
+            <a:xfrm>
+              <a:off x="670441" y="5334072"/>
+              <a:ext cx="2218501" cy="777288"/>
+            </a:xfrm>
+            <a:prstGeom prst="rect">
+              <a:avLst/>
+            </a:prstGeom>
+            <a:solidFill>
+              <a:schemeClr val="accent4">
+                <a:lumMod val="20000"/>
+                <a:lumOff val="80000"/>
+              </a:schemeClr>
+            </a:solidFill>
+          </p:spPr>
+          <p:style>
+            <a:lnRef idx="2">
+              <a:schemeClr val="accent1">
+                <a:shade val="50000"/>
+              </a:schemeClr>
+            </a:lnRef>
+            <a:fillRef idx="1">
+              <a:schemeClr val="accent1"/>
+            </a:fillRef>
+            <a:effectRef idx="0">
+              <a:schemeClr val="accent1"/>
+            </a:effectRef>
+            <a:fontRef idx="minor">
+              <a:schemeClr val="lt1"/>
+            </a:fontRef>
+          </p:style>
+          <p:txBody>
+            <a:bodyPr rtlCol="0" anchor="ctr"/>
+            <a:lstStyle/>
+            <a:p>
+              <a:pPr algn="ctr"/>
+              <a:endParaRPr lang="en-US" sz="1801" noProof="1"/>
+            </a:p>
+          </p:txBody>
+        </p:sp>
+        <p:sp>
+          <p:nvSpPr>
+            <p:cNvPr id="48" name="Rectangle 47"/>
+            <p:cNvSpPr/>
+            <p:nvPr/>
+          </p:nvSpPr>
+          <p:spPr>
+            <a:xfrm>
+              <a:off x="2646639" y="5334069"/>
+              <a:ext cx="2020457" cy="777291"/>
+            </a:xfrm>
+            <a:prstGeom prst="rect">
+              <a:avLst/>
+            </a:prstGeom>
+            <a:solidFill>
+              <a:schemeClr val="accent2">
+                <a:lumMod val="20000"/>
+                <a:lumOff val="80000"/>
+              </a:schemeClr>
+            </a:solidFill>
+          </p:spPr>
+          <p:style>
+            <a:lnRef idx="2">
+              <a:schemeClr val="accent1">
+                <a:shade val="50000"/>
+              </a:schemeClr>
+            </a:lnRef>
+            <a:fillRef idx="1">
+              <a:schemeClr val="accent1"/>
+            </a:fillRef>
+            <a:effectRef idx="0">
+              <a:schemeClr val="accent1"/>
+            </a:effectRef>
+            <a:fontRef idx="minor">
+              <a:schemeClr val="lt1"/>
+            </a:fontRef>
+          </p:style>
+          <p:txBody>
+            <a:bodyPr rtlCol="0" anchor="ctr"/>
+            <a:lstStyle/>
+            <a:p>
+              <a:pPr algn="ctr"/>
+              <a:endParaRPr lang="en-US" sz="1801" noProof="1"/>
+            </a:p>
+          </p:txBody>
+        </p:sp>
+        <p:sp>
+          <p:nvSpPr>
+            <p:cNvPr id="50" name="TextBox 49"/>
+            <p:cNvSpPr txBox="1"/>
+            <p:nvPr/>
+          </p:nvSpPr>
+          <p:spPr>
+            <a:xfrm>
+              <a:off x="688949" y="5386818"/>
+              <a:ext cx="3586816" cy="646587"/>
+            </a:xfrm>
+            <a:prstGeom prst="rect">
+              <a:avLst/>
+            </a:prstGeom>
+            <a:noFill/>
+          </p:spPr>
+          <p:txBody>
+            <a:bodyPr wrap="square" rtlCol="0">
+              <a:spAutoFit/>
+            </a:bodyPr>
+            <a:lstStyle/>
+            <a:p>
+              <a:r>
+                <a:rPr lang="en-US" sz="1801" noProof="1"/>
+                <a:t>Storage:</a:t>
+              </a:r>
+            </a:p>
+            <a:p>
+              <a:r>
+                <a:rPr lang="en-US" sz="1801" noProof="1"/>
+                <a:t>spark.memory.storageFraction=0.5</a:t>
+              </a:r>
+            </a:p>
+          </p:txBody>
+        </p:sp>
+        <p:cxnSp>
+          <p:nvCxnSpPr>
+            <p:cNvPr id="54" name="Straight Arrow Connector 53"/>
+            <p:cNvCxnSpPr/>
+            <p:nvPr/>
+          </p:nvCxnSpPr>
+          <p:spPr>
+            <a:xfrm flipV="1">
+              <a:off x="2120565" y="5592288"/>
+              <a:ext cx="1087243" cy="4398"/>
+            </a:xfrm>
+            <a:prstGeom prst="straightConnector1">
+              <a:avLst/>
+            </a:prstGeom>
+            <a:ln w="57150">
+              <a:solidFill>
+                <a:schemeClr val="tx1"/>
+              </a:solidFill>
+              <a:headEnd type="triangle"/>
+              <a:tailEnd type="triangle"/>
+            </a:ln>
+          </p:spPr>
+          <p:style>
+            <a:lnRef idx="1">
+              <a:schemeClr val="accent1"/>
+            </a:lnRef>
+            <a:fillRef idx="0">
+              <a:schemeClr val="accent1"/>
+            </a:fillRef>
+            <a:effectRef idx="0">
+              <a:schemeClr val="accent1"/>
+            </a:effectRef>
+            <a:fontRef idx="minor">
+              <a:schemeClr val="tx1"/>
+            </a:fontRef>
+          </p:style>
+        </p:cxnSp>
+        <p:sp>
+          <p:nvSpPr>
+            <p:cNvPr id="49" name="TextBox 48"/>
+            <p:cNvSpPr txBox="1"/>
+            <p:nvPr/>
+          </p:nvSpPr>
+          <p:spPr>
+            <a:xfrm>
+              <a:off x="3264253" y="5375571"/>
+              <a:ext cx="1213199" cy="369460"/>
+            </a:xfrm>
+            <a:prstGeom prst="rect">
+              <a:avLst/>
+            </a:prstGeom>
+            <a:noFill/>
+          </p:spPr>
+          <p:txBody>
+            <a:bodyPr wrap="square" rtlCol="0">
+              <a:spAutoFit/>
+            </a:bodyPr>
+            <a:lstStyle/>
+            <a:p>
+              <a:r>
+                <a:rPr lang="en-US" sz="1801" noProof="1"/>
+                <a:t>Execution</a:t>
+              </a:r>
+            </a:p>
+          </p:txBody>
+        </p:sp>
+        <p:cxnSp>
+          <p:nvCxnSpPr>
+            <p:cNvPr id="4" name="Straight Connector 3"/>
+            <p:cNvCxnSpPr/>
+            <p:nvPr/>
+          </p:nvCxnSpPr>
+          <p:spPr>
+            <a:xfrm>
+              <a:off x="4666608" y="4550448"/>
+              <a:ext cx="4281" cy="1554174"/>
+            </a:xfrm>
+            <a:prstGeom prst="line">
+              <a:avLst/>
+            </a:prstGeom>
+            <a:ln w="28575">
+              <a:solidFill>
+                <a:schemeClr val="tx1"/>
+              </a:solidFill>
+            </a:ln>
+          </p:spPr>
+          <p:style>
+            <a:lnRef idx="1">
+              <a:schemeClr val="accent1"/>
+            </a:lnRef>
+            <a:fillRef idx="0">
+              <a:schemeClr val="accent1"/>
+            </a:fillRef>
+            <a:effectRef idx="0">
+              <a:schemeClr val="accent1"/>
+            </a:effectRef>
+            <a:fontRef idx="minor">
+              <a:schemeClr val="tx1"/>
+            </a:fontRef>
+          </p:style>
+        </p:cxnSp>
+      </p:grpSp>
       <p:cxnSp>
         <p:nvCxnSpPr>
-          <p:cNvPr id="16" name="Straight Connector 15"/>
-          <p:cNvCxnSpPr/>
+          <p:cNvPr id="7" name="Straight Connector 6">
+            <a:extLst>
+              <a:ext uri="{FF2B5EF4-FFF2-40B4-BE49-F238E27FC236}">
+                <a16:creationId xmlns:a16="http://schemas.microsoft.com/office/drawing/2014/main" id="{C7D745D8-1F71-49DA-80C5-407F78A9CD6D}"/>
+              </a:ext>
+            </a:extLst>
+          </p:cNvPr>
+          <p:cNvCxnSpPr>
+            <a:cxnSpLocks/>
+          </p:cNvCxnSpPr>
           <p:nvPr/>
         </p:nvCxnSpPr>
         <p:spPr>
           <a:xfrm>
-            <a:off x="6216115" y="4443162"/>
-            <a:ext cx="846237" cy="400950"/>
+            <a:off x="7540330" y="1138365"/>
+            <a:ext cx="0" cy="4990982"/>
           </a:xfrm>
           <a:prstGeom prst="line">
             <a:avLst/>
           </a:prstGeom>
+          <a:ln w="38100">
+            <a:prstDash val="sysDot"/>
+          </a:ln>
         </p:spPr>
         <p:style>
           <a:lnRef idx="1">
@@ -4132,25 +4687,24 @@
       </p:cxnSp>
       <p:sp>
         <p:nvSpPr>
-          <p:cNvPr id="40" name="Rectangle 39"/>
+          <p:cNvPr id="18" name="Arrow: Right 17">
+            <a:extLst>
+              <a:ext uri="{FF2B5EF4-FFF2-40B4-BE49-F238E27FC236}">
+                <a16:creationId xmlns:a16="http://schemas.microsoft.com/office/drawing/2014/main" id="{1BD15692-3031-4D20-B1F1-00B83F6B01EE}"/>
+              </a:ext>
+            </a:extLst>
+          </p:cNvPr>
           <p:cNvSpPr/>
           <p:nvPr/>
         </p:nvSpPr>
         <p:spPr>
           <a:xfrm>
-            <a:off x="670440" y="3930091"/>
-            <a:ext cx="6650049" cy="2174531"/>
+            <a:off x="6522366" y="2717952"/>
+            <a:ext cx="918945" cy="317466"/>
           </a:xfrm>
-          <a:prstGeom prst="rect">
+          <a:prstGeom prst="rightArrow">
             <a:avLst/>
           </a:prstGeom>
-          <a:solidFill>
-            <a:schemeClr val="accent1">
-              <a:lumMod val="20000"/>
-              <a:lumOff val="80000"/>
-            </a:schemeClr>
-          </a:solidFill>
-          <a:ln w="38100"/>
         </p:spPr>
         <p:style>
           <a:lnRef idx="2">
@@ -4173,587 +4727,10 @@
           <a:lstStyle/>
           <a:p>
             <a:pPr algn="ctr"/>
-            <a:endParaRPr lang="en-US" sz="1801" noProof="1"/>
-          </a:p>
-        </p:txBody>
-      </p:sp>
-      <p:sp>
-        <p:nvSpPr>
-          <p:cNvPr id="41" name="Rectangle 40"/>
-          <p:cNvSpPr/>
-          <p:nvPr/>
-        </p:nvSpPr>
-        <p:spPr>
-          <a:xfrm>
-            <a:off x="670441" y="4552562"/>
-            <a:ext cx="3996167" cy="1562485"/>
-          </a:xfrm>
-          <a:prstGeom prst="rect">
-            <a:avLst/>
-          </a:prstGeom>
-          <a:solidFill>
-            <a:schemeClr val="accent2">
-              <a:lumMod val="40000"/>
-              <a:lumOff val="60000"/>
-            </a:schemeClr>
-          </a:solidFill>
-        </p:spPr>
-        <p:style>
-          <a:lnRef idx="2">
-            <a:schemeClr val="accent1">
-              <a:shade val="50000"/>
-            </a:schemeClr>
-          </a:lnRef>
-          <a:fillRef idx="1">
-            <a:schemeClr val="accent1"/>
-          </a:fillRef>
-          <a:effectRef idx="0">
-            <a:schemeClr val="accent1"/>
-          </a:effectRef>
-          <a:fontRef idx="minor">
-            <a:schemeClr val="lt1"/>
-          </a:fontRef>
-        </p:style>
-        <p:txBody>
-          <a:bodyPr rtlCol="0" anchor="ctr"/>
-          <a:lstStyle/>
-          <a:p>
-            <a:pPr algn="ctr"/>
-            <a:endParaRPr lang="en-US" sz="1801" noProof="1"/>
-          </a:p>
-        </p:txBody>
-      </p:sp>
-      <p:sp>
-        <p:nvSpPr>
-          <p:cNvPr id="42" name="Rectangle 41"/>
-          <p:cNvSpPr/>
-          <p:nvPr/>
-        </p:nvSpPr>
-        <p:spPr>
-          <a:xfrm>
-            <a:off x="4668731" y="4550448"/>
-            <a:ext cx="1598269" cy="1557225"/>
-          </a:xfrm>
-          <a:prstGeom prst="rect">
-            <a:avLst/>
-          </a:prstGeom>
-          <a:solidFill>
-            <a:srgbClr val="F2D8EC"/>
-          </a:solidFill>
-        </p:spPr>
-        <p:style>
-          <a:lnRef idx="2">
-            <a:schemeClr val="accent1">
-              <a:shade val="50000"/>
-            </a:schemeClr>
-          </a:lnRef>
-          <a:fillRef idx="1">
-            <a:schemeClr val="accent1"/>
-          </a:fillRef>
-          <a:effectRef idx="0">
-            <a:schemeClr val="accent1"/>
-          </a:effectRef>
-          <a:fontRef idx="minor">
-            <a:schemeClr val="lt1"/>
-          </a:fontRef>
-        </p:style>
-        <p:txBody>
-          <a:bodyPr rtlCol="0" anchor="ctr"/>
-          <a:lstStyle/>
-          <a:p>
-            <a:endParaRPr lang="en-US" sz="1801" noProof="1">
-              <a:solidFill>
-                <a:schemeClr val="tx1"/>
-              </a:solidFill>
-            </a:endParaRPr>
-          </a:p>
-        </p:txBody>
-      </p:sp>
-      <p:sp>
-        <p:nvSpPr>
-          <p:cNvPr id="43" name="TextBox 42"/>
-          <p:cNvSpPr txBox="1"/>
-          <p:nvPr/>
-        </p:nvSpPr>
-        <p:spPr>
-          <a:xfrm>
-            <a:off x="697963" y="3931982"/>
-            <a:ext cx="3325259" cy="646587"/>
-          </a:xfrm>
-          <a:prstGeom prst="rect">
-            <a:avLst/>
-          </a:prstGeom>
-          <a:noFill/>
-        </p:spPr>
-        <p:txBody>
-          <a:bodyPr wrap="square" rtlCol="0">
-            <a:spAutoFit/>
-          </a:bodyPr>
-          <a:lstStyle/>
-          <a:p>
-            <a:r>
-              <a:rPr lang="en-US" sz="1801" noProof="1"/>
-              <a:t>Executor JVM </a:t>
-            </a:r>
-            <a:r>
-              <a:rPr lang="en-US" sz="1801" noProof="1" smtClean="0"/>
-              <a:t>Heap</a:t>
-            </a:r>
-          </a:p>
-          <a:p>
-            <a:r>
-              <a:rPr lang="en-US" sz="1801" b="1" noProof="1" smtClean="0"/>
-              <a:t>spark.executor.memory=&lt;size&gt;</a:t>
-            </a:r>
-            <a:endParaRPr lang="en-US" sz="1801" noProof="1"/>
-          </a:p>
-        </p:txBody>
-      </p:sp>
-      <p:sp>
-        <p:nvSpPr>
-          <p:cNvPr id="44" name="TextBox 43"/>
-          <p:cNvSpPr txBox="1"/>
-          <p:nvPr/>
-        </p:nvSpPr>
-        <p:spPr>
-          <a:xfrm>
-            <a:off x="697772" y="4625737"/>
-            <a:ext cx="3169413" cy="646587"/>
-          </a:xfrm>
-          <a:prstGeom prst="rect">
-            <a:avLst/>
-          </a:prstGeom>
-          <a:noFill/>
-          <a:ln>
-            <a:noFill/>
-          </a:ln>
-        </p:spPr>
-        <p:txBody>
-          <a:bodyPr wrap="square" rtlCol="0">
-            <a:spAutoFit/>
-          </a:bodyPr>
-          <a:lstStyle/>
-          <a:p>
-            <a:r>
-              <a:rPr lang="en-US" sz="1801" noProof="1"/>
-              <a:t>On-Heap Unified Memory Pool</a:t>
-            </a:r>
-          </a:p>
-          <a:p>
-            <a:r>
-              <a:rPr lang="en-US" sz="1801" b="1" noProof="1" smtClean="0"/>
-              <a:t>spark.memory.fraction</a:t>
-            </a:r>
-            <a:r>
-              <a:rPr lang="en-US" sz="1801" noProof="1" smtClean="0"/>
-              <a:t>=0.6</a:t>
-            </a:r>
-            <a:endParaRPr lang="en-US" sz="1801" noProof="1"/>
-          </a:p>
-        </p:txBody>
-      </p:sp>
-      <p:sp>
-        <p:nvSpPr>
-          <p:cNvPr id="45" name="Rectangle 44"/>
-          <p:cNvSpPr/>
-          <p:nvPr/>
-        </p:nvSpPr>
-        <p:spPr>
-          <a:xfrm>
-            <a:off x="6259399" y="4550448"/>
-            <a:ext cx="1049559" cy="1557226"/>
-          </a:xfrm>
-          <a:prstGeom prst="rect">
-            <a:avLst/>
-          </a:prstGeom>
-          <a:solidFill>
-            <a:schemeClr val="bg2">
-              <a:lumMod val="90000"/>
-            </a:schemeClr>
-          </a:solidFill>
-          <a:ln>
-            <a:solidFill>
-              <a:schemeClr val="tx1">
-                <a:lumMod val="50000"/>
-                <a:lumOff val="50000"/>
-              </a:schemeClr>
-            </a:solidFill>
-          </a:ln>
-        </p:spPr>
-        <p:style>
-          <a:lnRef idx="2">
-            <a:schemeClr val="accent1">
-              <a:shade val="50000"/>
-            </a:schemeClr>
-          </a:lnRef>
-          <a:fillRef idx="1">
-            <a:schemeClr val="accent1"/>
-          </a:fillRef>
-          <a:effectRef idx="0">
-            <a:schemeClr val="accent1"/>
-          </a:effectRef>
-          <a:fontRef idx="minor">
-            <a:schemeClr val="lt1"/>
-          </a:fontRef>
-        </p:style>
-        <p:txBody>
-          <a:bodyPr rtlCol="0" anchor="ctr"/>
-          <a:lstStyle/>
-          <a:p>
-            <a:pPr algn="ctr"/>
-            <a:endParaRPr lang="en-US" sz="1801" noProof="1">
-              <a:solidFill>
-                <a:schemeClr val="tx1"/>
-              </a:solidFill>
-            </a:endParaRPr>
-          </a:p>
-        </p:txBody>
-      </p:sp>
-      <p:sp>
-        <p:nvSpPr>
-          <p:cNvPr id="32" name="TextBox 31"/>
-          <p:cNvSpPr txBox="1"/>
-          <p:nvPr/>
-        </p:nvSpPr>
-        <p:spPr>
-          <a:xfrm>
-            <a:off x="4664529" y="4546585"/>
-            <a:ext cx="1540056" cy="1477969"/>
-          </a:xfrm>
-          <a:prstGeom prst="rect">
-            <a:avLst/>
-          </a:prstGeom>
-          <a:noFill/>
-        </p:spPr>
-        <p:txBody>
-          <a:bodyPr wrap="square" rtlCol="0">
-            <a:spAutoFit/>
-          </a:bodyPr>
-          <a:lstStyle/>
-          <a:p>
-            <a:r>
-              <a:rPr lang="en-US" sz="1801" noProof="1"/>
-              <a:t>User Memory:</a:t>
-            </a:r>
-          </a:p>
-          <a:p>
-            <a:r>
-              <a:rPr lang="en-US" sz="1801" noProof="1"/>
-              <a:t>1 </a:t>
-            </a:r>
-            <a:r>
-              <a:rPr lang="en-US" sz="1801" noProof="1" smtClean="0"/>
-              <a:t>-spark.memory.fraction=0.4</a:t>
-            </a:r>
-            <a:endParaRPr lang="en-US" sz="1801" noProof="1"/>
-          </a:p>
-          <a:p>
-            <a:endParaRPr lang="en-GB" sz="1801" dirty="0"/>
-          </a:p>
-        </p:txBody>
-      </p:sp>
-      <p:cxnSp>
-        <p:nvCxnSpPr>
-          <p:cNvPr id="46" name="Straight Connector 45"/>
-          <p:cNvCxnSpPr/>
-          <p:nvPr/>
-        </p:nvCxnSpPr>
-        <p:spPr>
-          <a:xfrm>
-            <a:off x="6261500" y="4557186"/>
-            <a:ext cx="4281" cy="1554174"/>
-          </a:xfrm>
-          <a:prstGeom prst="line">
-            <a:avLst/>
-          </a:prstGeom>
-          <a:ln w="28575">
-            <a:solidFill>
-              <a:schemeClr val="tx1"/>
-            </a:solidFill>
-          </a:ln>
-        </p:spPr>
-        <p:style>
-          <a:lnRef idx="1">
-            <a:schemeClr val="accent1"/>
-          </a:lnRef>
-          <a:fillRef idx="0">
-            <a:schemeClr val="accent1"/>
-          </a:fillRef>
-          <a:effectRef idx="0">
-            <a:schemeClr val="accent1"/>
-          </a:effectRef>
-          <a:fontRef idx="minor">
-            <a:schemeClr val="tx1"/>
-          </a:fontRef>
-        </p:style>
-      </p:cxnSp>
-      <p:sp>
-        <p:nvSpPr>
-          <p:cNvPr id="33" name="TextBox 32"/>
-          <p:cNvSpPr txBox="1"/>
-          <p:nvPr/>
-        </p:nvSpPr>
-        <p:spPr>
-          <a:xfrm>
-            <a:off x="6142733" y="4552563"/>
-            <a:ext cx="1293510" cy="923714"/>
-          </a:xfrm>
-          <a:prstGeom prst="rect">
-            <a:avLst/>
-          </a:prstGeom>
-          <a:noFill/>
-        </p:spPr>
-        <p:txBody>
-          <a:bodyPr wrap="square" rtlCol="0">
-            <a:spAutoFit/>
-          </a:bodyPr>
-          <a:lstStyle/>
-          <a:p>
-            <a:pPr algn="ctr"/>
-            <a:r>
-              <a:rPr lang="en-US" sz="1801" noProof="1"/>
-              <a:t>Reserved Memory:</a:t>
-            </a:r>
-          </a:p>
-          <a:p>
-            <a:pPr algn="ctr"/>
-            <a:r>
-              <a:rPr lang="en-US" sz="1801" noProof="1"/>
-              <a:t>300 MB</a:t>
-            </a:r>
-            <a:endParaRPr lang="en-GB" sz="1801" dirty="0"/>
-          </a:p>
-        </p:txBody>
-      </p:sp>
-      <p:sp>
-        <p:nvSpPr>
-          <p:cNvPr id="47" name="Rectangle 46"/>
-          <p:cNvSpPr/>
-          <p:nvPr/>
-        </p:nvSpPr>
-        <p:spPr>
-          <a:xfrm>
-            <a:off x="670441" y="5334072"/>
-            <a:ext cx="2218501" cy="777288"/>
-          </a:xfrm>
-          <a:prstGeom prst="rect">
-            <a:avLst/>
-          </a:prstGeom>
-          <a:solidFill>
-            <a:schemeClr val="accent4">
-              <a:lumMod val="20000"/>
-              <a:lumOff val="80000"/>
-            </a:schemeClr>
-          </a:solidFill>
-        </p:spPr>
-        <p:style>
-          <a:lnRef idx="2">
-            <a:schemeClr val="accent1">
-              <a:shade val="50000"/>
-            </a:schemeClr>
-          </a:lnRef>
-          <a:fillRef idx="1">
-            <a:schemeClr val="accent1"/>
-          </a:fillRef>
-          <a:effectRef idx="0">
-            <a:schemeClr val="accent1"/>
-          </a:effectRef>
-          <a:fontRef idx="minor">
-            <a:schemeClr val="lt1"/>
-          </a:fontRef>
-        </p:style>
-        <p:txBody>
-          <a:bodyPr rtlCol="0" anchor="ctr"/>
-          <a:lstStyle/>
-          <a:p>
-            <a:pPr algn="ctr"/>
-            <a:endParaRPr lang="en-US" sz="1801" noProof="1"/>
-          </a:p>
-        </p:txBody>
-      </p:sp>
-      <p:sp>
-        <p:nvSpPr>
-          <p:cNvPr id="48" name="Rectangle 47"/>
-          <p:cNvSpPr/>
-          <p:nvPr/>
-        </p:nvSpPr>
-        <p:spPr>
-          <a:xfrm>
-            <a:off x="2646639" y="5334069"/>
-            <a:ext cx="2020457" cy="777291"/>
-          </a:xfrm>
-          <a:prstGeom prst="rect">
-            <a:avLst/>
-          </a:prstGeom>
-          <a:solidFill>
-            <a:schemeClr val="accent2">
-              <a:lumMod val="20000"/>
-              <a:lumOff val="80000"/>
-            </a:schemeClr>
-          </a:solidFill>
-        </p:spPr>
-        <p:style>
-          <a:lnRef idx="2">
-            <a:schemeClr val="accent1">
-              <a:shade val="50000"/>
-            </a:schemeClr>
-          </a:lnRef>
-          <a:fillRef idx="1">
-            <a:schemeClr val="accent1"/>
-          </a:fillRef>
-          <a:effectRef idx="0">
-            <a:schemeClr val="accent1"/>
-          </a:effectRef>
-          <a:fontRef idx="minor">
-            <a:schemeClr val="lt1"/>
-          </a:fontRef>
-        </p:style>
-        <p:txBody>
-          <a:bodyPr rtlCol="0" anchor="ctr"/>
-          <a:lstStyle/>
-          <a:p>
-            <a:pPr algn="ctr"/>
-            <a:endParaRPr lang="en-US" sz="1801" noProof="1"/>
-          </a:p>
-        </p:txBody>
-      </p:sp>
-      <p:sp>
-        <p:nvSpPr>
-          <p:cNvPr id="50" name="TextBox 49"/>
-          <p:cNvSpPr txBox="1"/>
-          <p:nvPr/>
-        </p:nvSpPr>
-        <p:spPr>
-          <a:xfrm>
-            <a:off x="688949" y="5386818"/>
-            <a:ext cx="3586816" cy="646587"/>
-          </a:xfrm>
-          <a:prstGeom prst="rect">
-            <a:avLst/>
-          </a:prstGeom>
-          <a:noFill/>
-        </p:spPr>
-        <p:txBody>
-          <a:bodyPr wrap="square" rtlCol="0">
-            <a:spAutoFit/>
-          </a:bodyPr>
-          <a:lstStyle/>
-          <a:p>
-            <a:r>
-              <a:rPr lang="en-US" sz="1801" noProof="1"/>
-              <a:t>Storage:</a:t>
-            </a:r>
-          </a:p>
-          <a:p>
-            <a:r>
-              <a:rPr lang="en-US" sz="1801" noProof="1" smtClean="0"/>
-              <a:t>spark.memory.storageFraction=0.5</a:t>
-            </a:r>
-            <a:endParaRPr lang="en-US" sz="1801" noProof="1"/>
-          </a:p>
-        </p:txBody>
-      </p:sp>
-      <p:cxnSp>
-        <p:nvCxnSpPr>
-          <p:cNvPr id="54" name="Straight Arrow Connector 53"/>
-          <p:cNvCxnSpPr/>
-          <p:nvPr/>
-        </p:nvCxnSpPr>
-        <p:spPr>
-          <a:xfrm flipV="1">
-            <a:off x="2120565" y="5592288"/>
-            <a:ext cx="1087243" cy="4398"/>
-          </a:xfrm>
-          <a:prstGeom prst="straightConnector1">
-            <a:avLst/>
-          </a:prstGeom>
-          <a:ln w="57150">
-            <a:solidFill>
-              <a:schemeClr val="tx1"/>
-            </a:solidFill>
-            <a:headEnd type="triangle"/>
-            <a:tailEnd type="triangle"/>
-          </a:ln>
-        </p:spPr>
-        <p:style>
-          <a:lnRef idx="1">
-            <a:schemeClr val="accent1"/>
-          </a:lnRef>
-          <a:fillRef idx="0">
-            <a:schemeClr val="accent1"/>
-          </a:fillRef>
-          <a:effectRef idx="0">
-            <a:schemeClr val="accent1"/>
-          </a:effectRef>
-          <a:fontRef idx="minor">
-            <a:schemeClr val="tx1"/>
-          </a:fontRef>
-        </p:style>
-      </p:cxnSp>
-      <p:sp>
-        <p:nvSpPr>
-          <p:cNvPr id="49" name="TextBox 48"/>
-          <p:cNvSpPr txBox="1"/>
-          <p:nvPr/>
-        </p:nvSpPr>
-        <p:spPr>
-          <a:xfrm>
-            <a:off x="3264253" y="5375571"/>
-            <a:ext cx="1213199" cy="369460"/>
-          </a:xfrm>
-          <a:prstGeom prst="rect">
-            <a:avLst/>
-          </a:prstGeom>
-          <a:noFill/>
-        </p:spPr>
-        <p:txBody>
-          <a:bodyPr wrap="square" rtlCol="0">
-            <a:spAutoFit/>
-          </a:bodyPr>
-          <a:lstStyle/>
-          <a:p>
-            <a:r>
-              <a:rPr lang="en-US" sz="1801" noProof="1"/>
-              <a:t>Execution</a:t>
-            </a:r>
-          </a:p>
-        </p:txBody>
-      </p:sp>
-      <p:cxnSp>
-        <p:nvCxnSpPr>
-          <p:cNvPr id="4" name="Straight Connector 3"/>
-          <p:cNvCxnSpPr/>
-          <p:nvPr/>
-        </p:nvCxnSpPr>
-        <p:spPr>
-          <a:xfrm>
-            <a:off x="4666608" y="4550448"/>
-            <a:ext cx="4281" cy="1554174"/>
-          </a:xfrm>
-          <a:prstGeom prst="line">
-            <a:avLst/>
-          </a:prstGeom>
-          <a:ln w="28575">
-            <a:solidFill>
-              <a:schemeClr val="tx1"/>
-            </a:solidFill>
-          </a:ln>
-        </p:spPr>
-        <p:style>
-          <a:lnRef idx="1">
-            <a:schemeClr val="accent1"/>
-          </a:lnRef>
-          <a:fillRef idx="0">
-            <a:schemeClr val="accent1"/>
-          </a:fillRef>
-          <a:effectRef idx="0">
-            <a:schemeClr val="accent1"/>
-          </a:effectRef>
-          <a:fontRef idx="minor">
-            <a:schemeClr val="tx1"/>
-          </a:fontRef>
-        </p:style>
-      </p:cxnSp>
+            <a:endParaRPr lang="en-US"/>
+          </a:p>
+        </p:txBody>
+      </p:sp>
     </p:spTree>
     <p:extLst>
       <p:ext uri="{BB962C8B-B14F-4D97-AF65-F5344CB8AC3E}">

</xml_diff>

<commit_message>
update Spark memory diagram
</commit_message>
<xml_diff>
--- a/Spark_Notes/SparkExecutorMemory.pptx
+++ b/Spark_Notes/SparkExecutorMemory.pptx
@@ -243,7 +243,7 @@
           <a:p>
             <a:fld id="{D6A4B39F-B1B7-4540-9CD5-34E08F14BC09}" type="datetimeFigureOut">
               <a:rPr lang="en-GB" smtClean="0"/>
-              <a:t>14/12/2021</a:t>
+              <a:t>09/05/2022</a:t>
             </a:fld>
             <a:endParaRPr lang="en-GB"/>
           </a:p>
@@ -413,7 +413,7 @@
           <a:p>
             <a:fld id="{D6A4B39F-B1B7-4540-9CD5-34E08F14BC09}" type="datetimeFigureOut">
               <a:rPr lang="en-GB" smtClean="0"/>
-              <a:t>14/12/2021</a:t>
+              <a:t>09/05/2022</a:t>
             </a:fld>
             <a:endParaRPr lang="en-GB"/>
           </a:p>
@@ -593,7 +593,7 @@
           <a:p>
             <a:fld id="{D6A4B39F-B1B7-4540-9CD5-34E08F14BC09}" type="datetimeFigureOut">
               <a:rPr lang="en-GB" smtClean="0"/>
-              <a:t>14/12/2021</a:t>
+              <a:t>09/05/2022</a:t>
             </a:fld>
             <a:endParaRPr lang="en-GB"/>
           </a:p>
@@ -763,7 +763,7 @@
           <a:p>
             <a:fld id="{D6A4B39F-B1B7-4540-9CD5-34E08F14BC09}" type="datetimeFigureOut">
               <a:rPr lang="en-GB" smtClean="0"/>
-              <a:t>14/12/2021</a:t>
+              <a:t>09/05/2022</a:t>
             </a:fld>
             <a:endParaRPr lang="en-GB"/>
           </a:p>
@@ -1009,7 +1009,7 @@
           <a:p>
             <a:fld id="{D6A4B39F-B1B7-4540-9CD5-34E08F14BC09}" type="datetimeFigureOut">
               <a:rPr lang="en-GB" smtClean="0"/>
-              <a:t>14/12/2021</a:t>
+              <a:t>09/05/2022</a:t>
             </a:fld>
             <a:endParaRPr lang="en-GB"/>
           </a:p>
@@ -1241,7 +1241,7 @@
           <a:p>
             <a:fld id="{D6A4B39F-B1B7-4540-9CD5-34E08F14BC09}" type="datetimeFigureOut">
               <a:rPr lang="en-GB" smtClean="0"/>
-              <a:t>14/12/2021</a:t>
+              <a:t>09/05/2022</a:t>
             </a:fld>
             <a:endParaRPr lang="en-GB"/>
           </a:p>
@@ -1608,7 +1608,7 @@
           <a:p>
             <a:fld id="{D6A4B39F-B1B7-4540-9CD5-34E08F14BC09}" type="datetimeFigureOut">
               <a:rPr lang="en-GB" smtClean="0"/>
-              <a:t>14/12/2021</a:t>
+              <a:t>09/05/2022</a:t>
             </a:fld>
             <a:endParaRPr lang="en-GB"/>
           </a:p>
@@ -1726,7 +1726,7 @@
           <a:p>
             <a:fld id="{D6A4B39F-B1B7-4540-9CD5-34E08F14BC09}" type="datetimeFigureOut">
               <a:rPr lang="en-GB" smtClean="0"/>
-              <a:t>14/12/2021</a:t>
+              <a:t>09/05/2022</a:t>
             </a:fld>
             <a:endParaRPr lang="en-GB"/>
           </a:p>
@@ -1821,7 +1821,7 @@
           <a:p>
             <a:fld id="{D6A4B39F-B1B7-4540-9CD5-34E08F14BC09}" type="datetimeFigureOut">
               <a:rPr lang="en-GB" smtClean="0"/>
-              <a:t>14/12/2021</a:t>
+              <a:t>09/05/2022</a:t>
             </a:fld>
             <a:endParaRPr lang="en-GB"/>
           </a:p>
@@ -2098,7 +2098,7 @@
           <a:p>
             <a:fld id="{D6A4B39F-B1B7-4540-9CD5-34E08F14BC09}" type="datetimeFigureOut">
               <a:rPr lang="en-GB" smtClean="0"/>
-              <a:t>14/12/2021</a:t>
+              <a:t>09/05/2022</a:t>
             </a:fld>
             <a:endParaRPr lang="en-GB"/>
           </a:p>
@@ -2351,7 +2351,7 @@
           <a:p>
             <a:fld id="{D6A4B39F-B1B7-4540-9CD5-34E08F14BC09}" type="datetimeFigureOut">
               <a:rPr lang="en-GB" smtClean="0"/>
-              <a:t>14/12/2021</a:t>
+              <a:t>09/05/2022</a:t>
             </a:fld>
             <a:endParaRPr lang="en-GB"/>
           </a:p>
@@ -2564,7 +2564,7 @@
           <a:p>
             <a:fld id="{D6A4B39F-B1B7-4540-9CD5-34E08F14BC09}" type="datetimeFigureOut">
               <a:rPr lang="en-GB" smtClean="0"/>
-              <a:t>14/12/2021</a:t>
+              <a:t>09/05/2022</a:t>
             </a:fld>
             <a:endParaRPr lang="en-GB"/>
           </a:p>
@@ -2977,8 +2977,8 @@
         </p:nvSpPr>
         <p:spPr>
           <a:xfrm>
-            <a:off x="7759475" y="1430171"/>
-            <a:ext cx="4026254" cy="1938992"/>
+            <a:off x="7725858" y="1138578"/>
+            <a:ext cx="4026254" cy="1754326"/>
           </a:xfrm>
           <a:prstGeom prst="rect">
             <a:avLst/>
@@ -2998,17 +2998,7 @@
           <a:p>
             <a:r>
               <a:rPr lang="en-US" sz="1200" noProof="1"/>
-              <a:t>Overhead memory: </a:t>
-            </a:r>
-          </a:p>
-          <a:p>
-            <a:pPr marL="171450" indent="-171450">
-              <a:buFontTx/>
-              <a:buChar char="-"/>
-            </a:pPr>
-            <a:r>
-              <a:rPr lang="en-US" sz="1200" noProof="1"/>
-              <a:t>for OS, filesystem cache, redundancy, and other native memory allocations:</a:t>
+              <a:t>Overhead memory, for OS, filesystem cache, redundancy, and other native memory allocations:</a:t>
             </a:r>
           </a:p>
           <a:p>
@@ -3080,10 +3070,10 @@
         </p:nvGrpSpPr>
         <p:grpSpPr>
           <a:xfrm>
-            <a:off x="1927833" y="1138365"/>
-            <a:ext cx="5311216" cy="2233631"/>
+            <a:off x="616332" y="1138365"/>
+            <a:ext cx="6622717" cy="2215127"/>
             <a:chOff x="2062172" y="1273757"/>
-            <a:chExt cx="5326134" cy="2233631"/>
+            <a:chExt cx="5326134" cy="2215127"/>
           </a:xfrm>
         </p:grpSpPr>
         <p:sp>
@@ -3172,7 +3162,7 @@
           <p:spPr>
             <a:xfrm>
               <a:off x="2074608" y="1727020"/>
-              <a:ext cx="4493732" cy="1745816"/>
+              <a:ext cx="4812999" cy="1745816"/>
             </a:xfrm>
             <a:prstGeom prst="rect">
               <a:avLst/>
@@ -3218,8 +3208,8 @@
           </p:nvSpPr>
           <p:spPr>
             <a:xfrm>
-              <a:off x="2074608" y="2344971"/>
-              <a:ext cx="1906274" cy="1136907"/>
+              <a:off x="2074607" y="2336345"/>
+              <a:ext cx="2402228" cy="1145533"/>
             </a:xfrm>
             <a:prstGeom prst="rect">
               <a:avLst/>
@@ -3269,8 +3259,8 @@
           </p:nvSpPr>
           <p:spPr>
             <a:xfrm>
-              <a:off x="3423597" y="2344971"/>
-              <a:ext cx="3144743" cy="1136907"/>
+              <a:off x="4494152" y="2336345"/>
+              <a:ext cx="2376138" cy="1136907"/>
             </a:xfrm>
             <a:prstGeom prst="rect">
               <a:avLst/>
@@ -3320,8 +3310,8 @@
           </p:nvSpPr>
           <p:spPr>
             <a:xfrm>
-              <a:off x="3545329" y="2306546"/>
-              <a:ext cx="3035447" cy="1200842"/>
+              <a:off x="4511642" y="2288042"/>
+              <a:ext cx="2294751" cy="1200842"/>
             </a:xfrm>
             <a:prstGeom prst="rect">
               <a:avLst/>
@@ -3356,7 +3346,7 @@
               </a:pPr>
               <a:r>
                 <a:rPr lang="en-US" sz="1801" noProof="1"/>
-                <a:t>PySpark allocations</a:t>
+                <a:t>Optional for PySpark</a:t>
               </a:r>
             </a:p>
             <a:p>
@@ -3366,7 +3356,7 @@
               </a:pPr>
               <a:r>
                 <a:rPr lang="en-US" sz="1801" noProof="1"/>
-                <a:t>Off-Heap unified memory</a:t>
+                <a:t>Optional Off-Heap</a:t>
               </a:r>
             </a:p>
           </p:txBody>
@@ -3379,8 +3369,8 @@
           </p:nvSpPr>
           <p:spPr>
             <a:xfrm>
-              <a:off x="2171761" y="2524223"/>
-              <a:ext cx="1251836" cy="646587"/>
+              <a:off x="2567907" y="2536893"/>
+              <a:ext cx="1652599" cy="646587"/>
             </a:xfrm>
             <a:prstGeom prst="rect">
               <a:avLst/>
@@ -3395,7 +3385,13 @@
             <a:p>
               <a:r>
                 <a:rPr lang="en-US" sz="1801" noProof="1"/>
-                <a:t>Executor JVM Heap</a:t>
+                <a:t>Executor JVM</a:t>
+              </a:r>
+            </a:p>
+            <a:p>
+              <a:r>
+                <a:rPr lang="en-US" sz="1801" noProof="1"/>
+                <a:t>Heap Memory</a:t>
               </a:r>
             </a:p>
           </p:txBody>
@@ -3408,8 +3404,8 @@
           </p:nvSpPr>
           <p:spPr>
             <a:xfrm>
-              <a:off x="2074040" y="1709028"/>
-              <a:ext cx="3559408" cy="923714"/>
+              <a:off x="2100151" y="1812629"/>
+              <a:ext cx="4660555" cy="646587"/>
             </a:xfrm>
             <a:prstGeom prst="rect">
               <a:avLst/>
@@ -3424,7 +3420,7 @@
             <a:p>
               <a:r>
                 <a:rPr lang="en-US" sz="1801" noProof="1"/>
-                <a:t>Spark Executor Container Memory (YARN, K8S, Mesos)</a:t>
+                <a:t>Spark Executor Container Memory (YARN, Kubernetes)</a:t>
               </a:r>
             </a:p>
             <a:p>
@@ -3441,7 +3437,7 @@
         </p:nvGrpSpPr>
         <p:grpSpPr>
           <a:xfrm>
-            <a:off x="7765123" y="3945838"/>
+            <a:off x="7734477" y="3209996"/>
             <a:ext cx="4096823" cy="2181322"/>
             <a:chOff x="7741375" y="3918127"/>
             <a:chExt cx="4096823" cy="2181322"/>
@@ -3935,7 +3931,7 @@
             </a:r>
             <a:r>
               <a:rPr lang="en-US" sz="1300" noProof="1"/>
-              <a:t> - May 2021, CC BY-SA 2.0</a:t>
+              <a:t> - May 2022, CC BY-SA 2.0</a:t>
             </a:r>
           </a:p>
         </p:txBody>
@@ -3948,7 +3944,7 @@
         </p:nvSpPr>
         <p:spPr>
           <a:xfrm>
-            <a:off x="2447448" y="3415237"/>
+            <a:off x="1817110" y="3423982"/>
             <a:ext cx="291875" cy="459384"/>
           </a:xfrm>
           <a:prstGeom prst="downArrow">
@@ -4193,13 +4189,13 @@
             <a:p>
               <a:r>
                 <a:rPr lang="en-US" sz="1801" noProof="1"/>
-                <a:t>Executor JVM Heap</a:t>
+                <a:t>Executor JVM Heap Memory</a:t>
               </a:r>
             </a:p>
             <a:p>
               <a:r>
                 <a:rPr lang="en-US" sz="1801" b="1" noProof="1"/>
-                <a:t>spark.executor.memory=&lt;size&gt;</a:t>
+                <a:t>spark.executor.memory = &lt;size&gt;</a:t>
               </a:r>
               <a:endParaRPr lang="en-US" sz="1801" noProof="1"/>
             </a:p>
@@ -4214,7 +4210,7 @@
           <p:spPr>
             <a:xfrm>
               <a:off x="697772" y="4625737"/>
-              <a:ext cx="3169413" cy="646587"/>
+              <a:ext cx="4042218" cy="646587"/>
             </a:xfrm>
             <a:prstGeom prst="rect">
               <a:avLst/>
@@ -4238,11 +4234,11 @@
             <a:p>
               <a:r>
                 <a:rPr lang="en-US" sz="1801" b="1" noProof="1"/>
-                <a:t>spark.memory.fraction</a:t>
+                <a:t>spark.memory.fraction </a:t>
               </a:r>
               <a:r>
                 <a:rPr lang="en-US" sz="1801" noProof="1"/>
-                <a:t>=0.6</a:t>
+                <a:t>= 0.6</a:t>
               </a:r>
             </a:p>
           </p:txBody>
@@ -4334,7 +4330,7 @@
             <a:p>
               <a:r>
                 <a:rPr lang="en-US" sz="1801" noProof="1"/>
-                <a:t>1 -spark.memory.fraction=0.4</a:t>
+                <a:t>1 -spark.memory.fraction</a:t>
               </a:r>
             </a:p>
             <a:p>
@@ -4537,7 +4533,7 @@
             <a:p>
               <a:r>
                 <a:rPr lang="en-US" sz="1801" noProof="1"/>
-                <a:t>spark.memory.storageFraction=0.5</a:t>
+                <a:t>spark.memory.storageFraction = 0.5</a:t>
               </a:r>
             </a:p>
           </p:txBody>
@@ -4685,52 +4681,217 @@
           </a:fontRef>
         </p:style>
       </p:cxnSp>
-      <p:sp>
-        <p:nvSpPr>
-          <p:cNvPr id="18" name="Arrow: Right 17">
+      <p:cxnSp>
+        <p:nvCxnSpPr>
+          <p:cNvPr id="6" name="Straight Arrow Connector 5">
             <a:extLst>
               <a:ext uri="{FF2B5EF4-FFF2-40B4-BE49-F238E27FC236}">
-                <a16:creationId xmlns:a16="http://schemas.microsoft.com/office/drawing/2014/main" id="{1BD15692-3031-4D20-B1F1-00B83F6B01EE}"/>
+                <a16:creationId xmlns:a16="http://schemas.microsoft.com/office/drawing/2014/main" id="{B4878967-36D6-4F3A-B44A-0104CFF394B1}"/>
               </a:ext>
             </a:extLst>
           </p:cNvPr>
-          <p:cNvSpPr/>
+          <p:cNvCxnSpPr>
+            <a:cxnSpLocks/>
+          </p:cNvCxnSpPr>
           <p:nvPr/>
-        </p:nvSpPr>
+        </p:nvCxnSpPr>
         <p:spPr>
-          <a:xfrm>
-            <a:off x="6522366" y="2717952"/>
-            <a:ext cx="918945" cy="317466"/>
+          <a:xfrm flipV="1">
+            <a:off x="6061293" y="1444929"/>
+            <a:ext cx="1607590" cy="1204049"/>
           </a:xfrm>
-          <a:prstGeom prst="rightArrow">
+          <a:prstGeom prst="straightConnector1">
             <a:avLst/>
           </a:prstGeom>
+          <a:ln>
+            <a:tailEnd type="triangle"/>
+          </a:ln>
         </p:spPr>
         <p:style>
-          <a:lnRef idx="2">
-            <a:schemeClr val="accent1">
-              <a:shade val="50000"/>
-            </a:schemeClr>
+          <a:lnRef idx="1">
+            <a:schemeClr val="accent1"/>
           </a:lnRef>
-          <a:fillRef idx="1">
+          <a:fillRef idx="0">
             <a:schemeClr val="accent1"/>
           </a:fillRef>
           <a:effectRef idx="0">
             <a:schemeClr val="accent1"/>
           </a:effectRef>
           <a:fontRef idx="minor">
-            <a:schemeClr val="lt1"/>
+            <a:schemeClr val="tx1"/>
           </a:fontRef>
         </p:style>
-        <p:txBody>
-          <a:bodyPr rtlCol="0" anchor="ctr"/>
-          <a:lstStyle/>
-          <a:p>
-            <a:pPr algn="ctr"/>
-            <a:endParaRPr lang="en-US"/>
-          </a:p>
-        </p:txBody>
-      </p:sp>
+      </p:cxnSp>
+      <p:cxnSp>
+        <p:nvCxnSpPr>
+          <p:cNvPr id="9" name="Straight Arrow Connector 8">
+            <a:extLst>
+              <a:ext uri="{FF2B5EF4-FFF2-40B4-BE49-F238E27FC236}">
+                <a16:creationId xmlns:a16="http://schemas.microsoft.com/office/drawing/2014/main" id="{E1217B0E-3901-4DF3-8630-98F4682BF6E2}"/>
+              </a:ext>
+            </a:extLst>
+          </p:cNvPr>
+          <p:cNvCxnSpPr>
+            <a:cxnSpLocks/>
+          </p:cNvCxnSpPr>
+          <p:nvPr/>
+        </p:nvCxnSpPr>
+        <p:spPr>
+          <a:xfrm flipV="1">
+            <a:off x="6061293" y="2464536"/>
+            <a:ext cx="1607590" cy="428368"/>
+          </a:xfrm>
+          <a:prstGeom prst="straightConnector1">
+            <a:avLst/>
+          </a:prstGeom>
+          <a:ln>
+            <a:tailEnd type="triangle"/>
+          </a:ln>
+        </p:spPr>
+        <p:style>
+          <a:lnRef idx="1">
+            <a:schemeClr val="accent1"/>
+          </a:lnRef>
+          <a:fillRef idx="0">
+            <a:schemeClr val="accent1"/>
+          </a:fillRef>
+          <a:effectRef idx="0">
+            <a:schemeClr val="accent1"/>
+          </a:effectRef>
+          <a:fontRef idx="minor">
+            <a:schemeClr val="tx1"/>
+          </a:fontRef>
+        </p:style>
+      </p:cxnSp>
+      <p:cxnSp>
+        <p:nvCxnSpPr>
+          <p:cNvPr id="12" name="Straight Arrow Connector 11">
+            <a:extLst>
+              <a:ext uri="{FF2B5EF4-FFF2-40B4-BE49-F238E27FC236}">
+                <a16:creationId xmlns:a16="http://schemas.microsoft.com/office/drawing/2014/main" id="{8B8AEBD4-A694-4676-8B45-E2833A42F830}"/>
+              </a:ext>
+            </a:extLst>
+          </p:cNvPr>
+          <p:cNvCxnSpPr>
+            <a:cxnSpLocks/>
+          </p:cNvCxnSpPr>
+          <p:nvPr/>
+        </p:nvCxnSpPr>
+        <p:spPr>
+          <a:xfrm>
+            <a:off x="6081846" y="3190338"/>
+            <a:ext cx="1586433" cy="252292"/>
+          </a:xfrm>
+          <a:prstGeom prst="straightConnector1">
+            <a:avLst/>
+          </a:prstGeom>
+          <a:ln>
+            <a:tailEnd type="triangle"/>
+          </a:ln>
+        </p:spPr>
+        <p:style>
+          <a:lnRef idx="1">
+            <a:schemeClr val="accent1"/>
+          </a:lnRef>
+          <a:fillRef idx="0">
+            <a:schemeClr val="accent1"/>
+          </a:fillRef>
+          <a:effectRef idx="0">
+            <a:schemeClr val="accent1"/>
+          </a:effectRef>
+          <a:fontRef idx="minor">
+            <a:schemeClr val="tx1"/>
+          </a:fontRef>
+        </p:style>
+      </p:cxnSp>
+      <p:sp>
+        <p:nvSpPr>
+          <p:cNvPr id="53" name="TextBox 52">
+            <a:extLst>
+              <a:ext uri="{FF2B5EF4-FFF2-40B4-BE49-F238E27FC236}">
+                <a16:creationId xmlns:a16="http://schemas.microsoft.com/office/drawing/2014/main" id="{7404E2D8-2F5B-4731-8168-A3961EB270FB}"/>
+              </a:ext>
+            </a:extLst>
+          </p:cNvPr>
+          <p:cNvSpPr txBox="1"/>
+          <p:nvPr/>
+        </p:nvSpPr>
+        <p:spPr>
+          <a:xfrm>
+            <a:off x="7733492" y="5681539"/>
+            <a:ext cx="4026254" cy="461665"/>
+          </a:xfrm>
+          <a:prstGeom prst="rect">
+            <a:avLst/>
+          </a:prstGeom>
+          <a:noFill/>
+          <a:ln w="6350">
+            <a:solidFill>
+              <a:schemeClr val="tx1"/>
+            </a:solidFill>
+          </a:ln>
+        </p:spPr>
+        <p:txBody>
+          <a:bodyPr wrap="square" rtlCol="0">
+            <a:spAutoFit/>
+          </a:bodyPr>
+          <a:lstStyle/>
+          <a:p>
+            <a:r>
+              <a:rPr lang="en-US" sz="1200" noProof="1"/>
+              <a:t>On-heap unified memory pool size = </a:t>
+            </a:r>
+            <a:br>
+              <a:rPr lang="en-US" sz="1200" noProof="1"/>
+            </a:br>
+            <a:r>
+              <a:rPr lang="en-US" sz="1200" noProof="1"/>
+              <a:t>(spark.executor.memory - 300 MB) * spark.memory.fraction</a:t>
+            </a:r>
+          </a:p>
+        </p:txBody>
+      </p:sp>
+      <p:cxnSp>
+        <p:nvCxnSpPr>
+          <p:cNvPr id="55" name="Straight Arrow Connector 54">
+            <a:extLst>
+              <a:ext uri="{FF2B5EF4-FFF2-40B4-BE49-F238E27FC236}">
+                <a16:creationId xmlns:a16="http://schemas.microsoft.com/office/drawing/2014/main" id="{B1BDDF47-993E-4298-B1A9-DB1423FD1D8B}"/>
+              </a:ext>
+            </a:extLst>
+          </p:cNvPr>
+          <p:cNvCxnSpPr>
+            <a:cxnSpLocks/>
+          </p:cNvCxnSpPr>
+          <p:nvPr/>
+        </p:nvCxnSpPr>
+        <p:spPr>
+          <a:xfrm>
+            <a:off x="3789412" y="5013601"/>
+            <a:ext cx="3877882" cy="795417"/>
+          </a:xfrm>
+          <a:prstGeom prst="straightConnector1">
+            <a:avLst/>
+          </a:prstGeom>
+          <a:ln>
+            <a:tailEnd type="triangle"/>
+          </a:ln>
+        </p:spPr>
+        <p:style>
+          <a:lnRef idx="1">
+            <a:schemeClr val="accent1"/>
+          </a:lnRef>
+          <a:fillRef idx="0">
+            <a:schemeClr val="accent1"/>
+          </a:fillRef>
+          <a:effectRef idx="0">
+            <a:schemeClr val="accent1"/>
+          </a:effectRef>
+          <a:fontRef idx="minor">
+            <a:schemeClr val="tx1"/>
+          </a:fontRef>
+        </p:style>
+      </p:cxnSp>
     </p:spTree>
     <p:extLst>
       <p:ext uri="{BB962C8B-B14F-4D97-AF65-F5344CB8AC3E}">

</xml_diff>

<commit_message>
minor update to the memory diagram
</commit_message>
<xml_diff>
--- a/Spark_Notes/SparkExecutorMemory.pptx
+++ b/Spark_Notes/SparkExecutorMemory.pptx
@@ -243,7 +243,7 @@
           <a:p>
             <a:fld id="{D6A4B39F-B1B7-4540-9CD5-34E08F14BC09}" type="datetimeFigureOut">
               <a:rPr lang="en-GB" smtClean="0"/>
-              <a:t>09/05/2022</a:t>
+              <a:t>23/05/2022</a:t>
             </a:fld>
             <a:endParaRPr lang="en-GB"/>
           </a:p>
@@ -413,7 +413,7 @@
           <a:p>
             <a:fld id="{D6A4B39F-B1B7-4540-9CD5-34E08F14BC09}" type="datetimeFigureOut">
               <a:rPr lang="en-GB" smtClean="0"/>
-              <a:t>09/05/2022</a:t>
+              <a:t>23/05/2022</a:t>
             </a:fld>
             <a:endParaRPr lang="en-GB"/>
           </a:p>
@@ -593,7 +593,7 @@
           <a:p>
             <a:fld id="{D6A4B39F-B1B7-4540-9CD5-34E08F14BC09}" type="datetimeFigureOut">
               <a:rPr lang="en-GB" smtClean="0"/>
-              <a:t>09/05/2022</a:t>
+              <a:t>23/05/2022</a:t>
             </a:fld>
             <a:endParaRPr lang="en-GB"/>
           </a:p>
@@ -763,7 +763,7 @@
           <a:p>
             <a:fld id="{D6A4B39F-B1B7-4540-9CD5-34E08F14BC09}" type="datetimeFigureOut">
               <a:rPr lang="en-GB" smtClean="0"/>
-              <a:t>09/05/2022</a:t>
+              <a:t>23/05/2022</a:t>
             </a:fld>
             <a:endParaRPr lang="en-GB"/>
           </a:p>
@@ -1009,7 +1009,7 @@
           <a:p>
             <a:fld id="{D6A4B39F-B1B7-4540-9CD5-34E08F14BC09}" type="datetimeFigureOut">
               <a:rPr lang="en-GB" smtClean="0"/>
-              <a:t>09/05/2022</a:t>
+              <a:t>23/05/2022</a:t>
             </a:fld>
             <a:endParaRPr lang="en-GB"/>
           </a:p>
@@ -1241,7 +1241,7 @@
           <a:p>
             <a:fld id="{D6A4B39F-B1B7-4540-9CD5-34E08F14BC09}" type="datetimeFigureOut">
               <a:rPr lang="en-GB" smtClean="0"/>
-              <a:t>09/05/2022</a:t>
+              <a:t>23/05/2022</a:t>
             </a:fld>
             <a:endParaRPr lang="en-GB"/>
           </a:p>
@@ -1608,7 +1608,7 @@
           <a:p>
             <a:fld id="{D6A4B39F-B1B7-4540-9CD5-34E08F14BC09}" type="datetimeFigureOut">
               <a:rPr lang="en-GB" smtClean="0"/>
-              <a:t>09/05/2022</a:t>
+              <a:t>23/05/2022</a:t>
             </a:fld>
             <a:endParaRPr lang="en-GB"/>
           </a:p>
@@ -1726,7 +1726,7 @@
           <a:p>
             <a:fld id="{D6A4B39F-B1B7-4540-9CD5-34E08F14BC09}" type="datetimeFigureOut">
               <a:rPr lang="en-GB" smtClean="0"/>
-              <a:t>09/05/2022</a:t>
+              <a:t>23/05/2022</a:t>
             </a:fld>
             <a:endParaRPr lang="en-GB"/>
           </a:p>
@@ -1821,7 +1821,7 @@
           <a:p>
             <a:fld id="{D6A4B39F-B1B7-4540-9CD5-34E08F14BC09}" type="datetimeFigureOut">
               <a:rPr lang="en-GB" smtClean="0"/>
-              <a:t>09/05/2022</a:t>
+              <a:t>23/05/2022</a:t>
             </a:fld>
             <a:endParaRPr lang="en-GB"/>
           </a:p>
@@ -2098,7 +2098,7 @@
           <a:p>
             <a:fld id="{D6A4B39F-B1B7-4540-9CD5-34E08F14BC09}" type="datetimeFigureOut">
               <a:rPr lang="en-GB" smtClean="0"/>
-              <a:t>09/05/2022</a:t>
+              <a:t>23/05/2022</a:t>
             </a:fld>
             <a:endParaRPr lang="en-GB"/>
           </a:p>
@@ -2351,7 +2351,7 @@
           <a:p>
             <a:fld id="{D6A4B39F-B1B7-4540-9CD5-34E08F14BC09}" type="datetimeFigureOut">
               <a:rPr lang="en-GB" smtClean="0"/>
-              <a:t>09/05/2022</a:t>
+              <a:t>23/05/2022</a:t>
             </a:fld>
             <a:endParaRPr lang="en-GB"/>
           </a:p>
@@ -2564,7 +2564,7 @@
           <a:p>
             <a:fld id="{D6A4B39F-B1B7-4540-9CD5-34E08F14BC09}" type="datetimeFigureOut">
               <a:rPr lang="en-GB" smtClean="0"/>
-              <a:t>09/05/2022</a:t>
+              <a:t>23/05/2022</a:t>
             </a:fld>
             <a:endParaRPr lang="en-GB"/>
           </a:p>
@@ -3944,7 +3944,7 @@
         </p:nvSpPr>
         <p:spPr>
           <a:xfrm>
-            <a:off x="1739070" y="3408234"/>
+            <a:off x="1799520" y="3423053"/>
             <a:ext cx="350825" cy="545290"/>
           </a:xfrm>
           <a:prstGeom prst="downArrow">
@@ -3978,10 +3978,10 @@
       </p:sp>
       <p:grpSp>
         <p:nvGrpSpPr>
-          <p:cNvPr id="19" name="Group 18">
+          <p:cNvPr id="8" name="Group 7">
             <a:extLst>
               <a:ext uri="{FF2B5EF4-FFF2-40B4-BE49-F238E27FC236}">
-                <a16:creationId xmlns:a16="http://schemas.microsoft.com/office/drawing/2014/main" id="{A742CB54-C2C4-4CBE-AAB1-44DE7B2E6863}"/>
+                <a16:creationId xmlns:a16="http://schemas.microsoft.com/office/drawing/2014/main" id="{15867E82-1A5C-4073-9329-4388842E3AF2}"/>
               </a:ext>
             </a:extLst>
           </p:cNvPr>
@@ -3990,10 +3990,10 @@
         </p:nvGrpSpPr>
         <p:grpSpPr>
           <a:xfrm>
-            <a:off x="583859" y="4025721"/>
-            <a:ext cx="6765803" cy="2184956"/>
-            <a:chOff x="670440" y="3930091"/>
-            <a:chExt cx="6765803" cy="2184956"/>
+            <a:off x="466968" y="4025721"/>
+            <a:ext cx="6813749" cy="2174531"/>
+            <a:chOff x="466968" y="4025721"/>
+            <a:chExt cx="6813749" cy="2174531"/>
           </a:xfrm>
         </p:grpSpPr>
         <p:cxnSp>
@@ -4004,7 +4004,7 @@
           </p:nvCxnSpPr>
           <p:spPr>
             <a:xfrm>
-              <a:off x="6216115" y="4443162"/>
+              <a:off x="6129534" y="4538792"/>
               <a:ext cx="846237" cy="400950"/>
             </a:xfrm>
             <a:prstGeom prst="line">
@@ -4034,7 +4034,7 @@
           </p:nvSpPr>
           <p:spPr>
             <a:xfrm>
-              <a:off x="670440" y="3930091"/>
+              <a:off x="583859" y="4025721"/>
               <a:ext cx="6650049" cy="2174531"/>
             </a:xfrm>
             <a:prstGeom prst="rect">
@@ -4081,7 +4081,7 @@
           </p:nvSpPr>
           <p:spPr>
             <a:xfrm>
-              <a:off x="670441" y="4552562"/>
+              <a:off x="3211168" y="4625674"/>
               <a:ext cx="3996167" cy="1562485"/>
             </a:xfrm>
             <a:prstGeom prst="rect">
@@ -4127,7 +4127,7 @@
           </p:nvSpPr>
           <p:spPr>
             <a:xfrm>
-              <a:off x="4668731" y="4550448"/>
+              <a:off x="1617505" y="4628570"/>
               <a:ext cx="1598269" cy="1557225"/>
             </a:xfrm>
             <a:prstGeom prst="rect">
@@ -4173,7 +4173,7 @@
           </p:nvSpPr>
           <p:spPr>
             <a:xfrm>
-              <a:off x="697963" y="3931982"/>
+              <a:off x="611382" y="4027612"/>
               <a:ext cx="3325259" cy="646587"/>
             </a:xfrm>
             <a:prstGeom prst="rect">
@@ -4209,7 +4209,7 @@
           </p:nvSpPr>
           <p:spPr>
             <a:xfrm>
-              <a:off x="697772" y="4625737"/>
+              <a:off x="3238499" y="4698849"/>
               <a:ext cx="4042218" cy="646587"/>
             </a:xfrm>
             <a:prstGeom prst="rect">
@@ -4251,7 +4251,7 @@
           </p:nvSpPr>
           <p:spPr>
             <a:xfrm>
-              <a:off x="6259399" y="4550448"/>
+              <a:off x="609763" y="4627246"/>
               <a:ext cx="1049559" cy="1557226"/>
             </a:xfrm>
             <a:prstGeom prst="rect">
@@ -4308,7 +4308,7 @@
           </p:nvSpPr>
           <p:spPr>
             <a:xfrm>
-              <a:off x="4664529" y="4546585"/>
+              <a:off x="1653289" y="4706905"/>
               <a:ext cx="1540056" cy="1477969"/>
             </a:xfrm>
             <a:prstGeom prst="rect">
@@ -4346,7 +4346,7 @@
           </p:nvCxnSpPr>
           <p:spPr>
             <a:xfrm>
-              <a:off x="6261500" y="4557186"/>
+              <a:off x="1659851" y="4619141"/>
               <a:ext cx="4281" cy="1554174"/>
             </a:xfrm>
             <a:prstGeom prst="line">
@@ -4381,7 +4381,7 @@
           </p:nvSpPr>
           <p:spPr>
             <a:xfrm>
-              <a:off x="6142733" y="4552563"/>
+              <a:off x="466968" y="4705752"/>
               <a:ext cx="1293510" cy="923714"/>
             </a:xfrm>
             <a:prstGeom prst="rect">
@@ -4419,8 +4419,8 @@
           </p:nvSpPr>
           <p:spPr>
             <a:xfrm>
-              <a:off x="670441" y="5334072"/>
-              <a:ext cx="2218501" cy="777288"/>
+              <a:off x="3210680" y="5407184"/>
+              <a:ext cx="2218989" cy="777288"/>
             </a:xfrm>
             <a:prstGeom prst="rect">
               <a:avLst/>
@@ -4465,7 +4465,7 @@
           </p:nvSpPr>
           <p:spPr>
             <a:xfrm>
-              <a:off x="2646639" y="5334069"/>
+              <a:off x="5187366" y="5407181"/>
               <a:ext cx="2020457" cy="777291"/>
             </a:xfrm>
             <a:prstGeom prst="rect">
@@ -4511,7 +4511,7 @@
           </p:nvSpPr>
           <p:spPr>
             <a:xfrm>
-              <a:off x="688949" y="5386818"/>
+              <a:off x="3229676" y="5459930"/>
               <a:ext cx="3586816" cy="646587"/>
             </a:xfrm>
             <a:prstGeom prst="rect">
@@ -4546,7 +4546,7 @@
           </p:nvCxnSpPr>
           <p:spPr>
             <a:xfrm flipV="1">
-              <a:off x="2120565" y="5592288"/>
+              <a:off x="4661292" y="5665400"/>
               <a:ext cx="1087243" cy="4398"/>
             </a:xfrm>
             <a:prstGeom prst="straightConnector1">
@@ -4583,7 +4583,7 @@
           </p:nvSpPr>
           <p:spPr>
             <a:xfrm>
-              <a:off x="3264253" y="5375571"/>
+              <a:off x="5804980" y="5448683"/>
               <a:ext cx="1213199" cy="369460"/>
             </a:xfrm>
             <a:prstGeom prst="rect">
@@ -4612,7 +4612,7 @@
           </p:nvCxnSpPr>
           <p:spPr>
             <a:xfrm>
-              <a:off x="4666608" y="4550448"/>
+              <a:off x="3205995" y="4622644"/>
               <a:ext cx="4281" cy="1554174"/>
             </a:xfrm>
             <a:prstGeom prst="line">
@@ -4873,8 +4873,8 @@
         </p:nvCxnSpPr>
         <p:spPr>
           <a:xfrm>
-            <a:off x="3662096" y="4939730"/>
-            <a:ext cx="4005198" cy="568319"/>
+            <a:off x="6338257" y="4932317"/>
+            <a:ext cx="1329037" cy="575732"/>
           </a:xfrm>
           <a:prstGeom prst="straightConnector1">
             <a:avLst/>

</xml_diff>